<commit_message>
Updated Logistics Director Position
</commit_message>
<xml_diff>
--- a/images/alliance-leadership/Brave-Leadership 2.pptx
+++ b/images/alliance-leadership/Brave-Leadership 2.pptx
@@ -333,9 +333,7 @@
 <file path=ppt/revisionInfo.xml><?xml version="1.0" encoding="utf-8"?>
 <p1510:revInfo xmlns:a="http://schemas.openxmlformats.org/drawingml/2006/main" xmlns:r="http://schemas.openxmlformats.org/officeDocument/2006/relationships" xmlns:p1510="http://schemas.microsoft.com/office/powerpoint/2015/10/main">
   <p1510:revLst>
-    <p1510:client id="{0CD06005-BE02-46D1-B07A-48E42C56809F}" v="5" dt="2021-11-29T23:04:16.369"/>
-    <p1510:client id="{4BE024F7-1545-4B72-AEEC-C0F382AEBC24}" v="1" dt="2021-11-30T22:07:32.014"/>
-    <p1510:client id="{9344AE72-F363-428B-B7F1-1C064A3A24DF}" v="120" dt="2021-11-30T22:34:37.864"/>
+    <p1510:client id="{9344AE72-F363-428B-B7F1-1C064A3A24DF}" v="123" dt="2021-12-17T00:09:07.009"/>
   </p1510:revLst>
 </p1510:revInfo>
 </file>
@@ -441,12 +439,12 @@
   <pc:docChgLst>
     <pc:chgData name="Aiden Jepson" userId="27ac3319768fac1a" providerId="LiveId" clId="{9344AE72-F363-428B-B7F1-1C064A3A24DF}"/>
     <pc:docChg chg="undo redo custSel modSld">
-      <pc:chgData name="Aiden Jepson" userId="27ac3319768fac1a" providerId="LiveId" clId="{9344AE72-F363-428B-B7F1-1C064A3A24DF}" dt="2021-11-30T22:36:18.624" v="191" actId="14100"/>
+      <pc:chgData name="Aiden Jepson" userId="27ac3319768fac1a" providerId="LiveId" clId="{9344AE72-F363-428B-B7F1-1C064A3A24DF}" dt="2021-12-17T00:09:07.008" v="229" actId="14826"/>
       <pc:docMkLst>
         <pc:docMk/>
       </pc:docMkLst>
       <pc:sldChg chg="addSp delSp modSp mod">
-        <pc:chgData name="Aiden Jepson" userId="27ac3319768fac1a" providerId="LiveId" clId="{9344AE72-F363-428B-B7F1-1C064A3A24DF}" dt="2021-11-30T22:36:18.624" v="191" actId="14100"/>
+        <pc:chgData name="Aiden Jepson" userId="27ac3319768fac1a" providerId="LiveId" clId="{9344AE72-F363-428B-B7F1-1C064A3A24DF}" dt="2021-12-17T00:09:07.008" v="229" actId="14826"/>
         <pc:sldMkLst>
           <pc:docMk/>
           <pc:sldMk cId="180280424" sldId="326"/>
@@ -459,6 +457,14 @@
             <ac:spMk id="19" creationId="{608F4391-B634-4647-8A0B-8ECA34A121BD}"/>
           </ac:spMkLst>
         </pc:spChg>
+        <pc:spChg chg="mod">
+          <ac:chgData name="Aiden Jepson" userId="27ac3319768fac1a" providerId="LiveId" clId="{9344AE72-F363-428B-B7F1-1C064A3A24DF}" dt="2021-12-17T00:08:59.789" v="227" actId="20577"/>
+          <ac:spMkLst>
+            <pc:docMk/>
+            <pc:sldMk cId="180280424" sldId="326"/>
+            <ac:spMk id="133" creationId="{9CD6EC34-8EEB-46FD-AF2F-9BB796E407EA}"/>
+          </ac:spMkLst>
+        </pc:spChg>
         <pc:picChg chg="add mod">
           <ac:chgData name="Aiden Jepson" userId="27ac3319768fac1a" providerId="LiveId" clId="{9344AE72-F363-428B-B7F1-1C064A3A24DF}" dt="2021-11-30T22:18:15.168" v="7" actId="1076"/>
           <ac:picMkLst>
@@ -467,8 +473,8 @@
             <ac:picMk id="9" creationId="{D40F93B3-220F-483A-A139-7736AF69F455}"/>
           </ac:picMkLst>
         </pc:picChg>
-        <pc:picChg chg="add mod">
-          <ac:chgData name="Aiden Jepson" userId="27ac3319768fac1a" providerId="LiveId" clId="{9344AE72-F363-428B-B7F1-1C064A3A24DF}" dt="2021-11-30T22:27:21.363" v="155" actId="14100"/>
+        <pc:picChg chg="add del mod">
+          <ac:chgData name="Aiden Jepson" userId="27ac3319768fac1a" providerId="LiveId" clId="{9344AE72-F363-428B-B7F1-1C064A3A24DF}" dt="2021-12-17T00:09:01.759" v="228" actId="478"/>
           <ac:picMkLst>
             <pc:docMk/>
             <pc:sldMk cId="180280424" sldId="326"/>
@@ -505,6 +511,22 @@
             <pc:docMk/>
             <pc:sldMk cId="180280424" sldId="326"/>
             <ac:picMk id="27" creationId="{98CEBC88-76FB-4223-A9DE-1C988649D7E9}"/>
+          </ac:picMkLst>
+        </pc:picChg>
+        <pc:picChg chg="mod">
+          <ac:chgData name="Aiden Jepson" userId="27ac3319768fac1a" providerId="LiveId" clId="{9344AE72-F363-428B-B7F1-1C064A3A24DF}" dt="2021-12-17T00:08:57.654" v="223" actId="14100"/>
+          <ac:picMkLst>
+            <pc:docMk/>
+            <pc:sldMk cId="180280424" sldId="326"/>
+            <ac:picMk id="130" creationId="{21EECA8D-7537-4FC0-B94F-71DCE19C40B8}"/>
+          </ac:picMkLst>
+        </pc:picChg>
+        <pc:picChg chg="mod">
+          <ac:chgData name="Aiden Jepson" userId="27ac3319768fac1a" providerId="LiveId" clId="{9344AE72-F363-428B-B7F1-1C064A3A24DF}" dt="2021-12-17T00:09:07.008" v="229" actId="14826"/>
+          <ac:picMkLst>
+            <pc:docMk/>
+            <pc:sldMk cId="180280424" sldId="326"/>
+            <ac:picMk id="135" creationId="{87D19866-70A9-43A6-8792-CE04481AD8F8}"/>
           </ac:picMkLst>
         </pc:picChg>
       </pc:sldChg>
@@ -2222,7 +2244,7 @@
           </a:ln>
           <a:extLst>
             <a:ext uri="{C572A759-6A51-4108-AA02-DFA0A04FC94B}">
-              <ma14:wrappingTextBoxFlag xmlns:ma14="http://schemas.microsoft.com/office/mac/drawingml/2011/main" xmlns:a14="http://schemas.microsoft.com/office/drawing/2010/main" xmlns:m="http://schemas.openxmlformats.org/officeDocument/2006/math" xmlns="" val="1"/>
+              <ma14:wrappingTextBoxFlag xmlns="" xmlns:m="http://schemas.openxmlformats.org/officeDocument/2006/math" xmlns:a14="http://schemas.microsoft.com/office/drawing/2010/main" xmlns:ma14="http://schemas.microsoft.com/office/mac/drawingml/2011/main" val="1"/>
             </a:ext>
           </a:extLst>
         </p:spPr>
@@ -2261,7 +2283,7 @@
           </a:ln>
           <a:extLst>
             <a:ext uri="{C572A759-6A51-4108-AA02-DFA0A04FC94B}">
-              <ma14:wrappingTextBoxFlag xmlns:ma14="http://schemas.microsoft.com/office/mac/drawingml/2011/main" xmlns:a14="http://schemas.microsoft.com/office/drawing/2010/main" xmlns:m="http://schemas.openxmlformats.org/officeDocument/2006/math" xmlns="" val="1"/>
+              <ma14:wrappingTextBoxFlag xmlns="" xmlns:m="http://schemas.openxmlformats.org/officeDocument/2006/math" xmlns:a14="http://schemas.microsoft.com/office/drawing/2010/main" xmlns:ma14="http://schemas.microsoft.com/office/mac/drawingml/2011/main" val="1"/>
             </a:ext>
           </a:extLst>
         </p:spPr>
@@ -3886,7 +3908,7 @@
           <a:effectLst/>
           <a:extLst>
             <a:ext uri="{C572A759-6A51-4108-AA02-DFA0A04FC94B}">
-              <ma14:wrappingTextBoxFlag xmlns:ma14="http://schemas.microsoft.com/office/mac/drawingml/2011/main" xmlns:a14="http://schemas.microsoft.com/office/drawing/2010/main" xmlns:m="http://schemas.openxmlformats.org/officeDocument/2006/math" xmlns="" val="1"/>
+              <ma14:wrappingTextBoxFlag xmlns="" xmlns:m="http://schemas.openxmlformats.org/officeDocument/2006/math" xmlns:a14="http://schemas.microsoft.com/office/drawing/2010/main" xmlns:ma14="http://schemas.microsoft.com/office/mac/drawingml/2011/main" val="1"/>
             </a:ext>
           </a:extLst>
         </p:spPr>
@@ -4189,7 +4211,7 @@
           <a:effectLst/>
           <a:extLst>
             <a:ext uri="{C572A759-6A51-4108-AA02-DFA0A04FC94B}">
-              <ma14:wrappingTextBoxFlag xmlns:ma14="http://schemas.microsoft.com/office/mac/drawingml/2011/main" xmlns:a14="http://schemas.microsoft.com/office/drawing/2010/main" xmlns:m="http://schemas.openxmlformats.org/officeDocument/2006/math" xmlns="" val="1"/>
+              <ma14:wrappingTextBoxFlag xmlns="" xmlns:m="http://schemas.openxmlformats.org/officeDocument/2006/math" xmlns:a14="http://schemas.microsoft.com/office/drawing/2010/main" xmlns:ma14="http://schemas.microsoft.com/office/mac/drawingml/2011/main" val="1"/>
             </a:ext>
           </a:extLst>
         </p:spPr>
@@ -4636,7 +4658,7 @@
           <a:effectLst/>
           <a:extLst>
             <a:ext uri="{C572A759-6A51-4108-AA02-DFA0A04FC94B}">
-              <ma14:wrappingTextBoxFlag xmlns:ma14="http://schemas.microsoft.com/office/mac/drawingml/2011/main" xmlns:a14="http://schemas.microsoft.com/office/drawing/2010/main" xmlns:m="http://schemas.openxmlformats.org/officeDocument/2006/math" xmlns="" val="1"/>
+              <ma14:wrappingTextBoxFlag xmlns="" xmlns:m="http://schemas.openxmlformats.org/officeDocument/2006/math" xmlns:a14="http://schemas.microsoft.com/office/drawing/2010/main" xmlns:ma14="http://schemas.microsoft.com/office/mac/drawingml/2011/main" val="1"/>
             </a:ext>
           </a:extLst>
         </p:spPr>
@@ -4940,7 +4962,7 @@
           <a:effectLst/>
           <a:extLst>
             <a:ext uri="{C572A759-6A51-4108-AA02-DFA0A04FC94B}">
-              <ma14:wrappingTextBoxFlag xmlns:ma14="http://schemas.microsoft.com/office/mac/drawingml/2011/main" xmlns:a14="http://schemas.microsoft.com/office/drawing/2010/main" xmlns:m="http://schemas.openxmlformats.org/officeDocument/2006/math" xmlns="" val="1"/>
+              <ma14:wrappingTextBoxFlag xmlns="" xmlns:m="http://schemas.openxmlformats.org/officeDocument/2006/math" xmlns:a14="http://schemas.microsoft.com/office/drawing/2010/main" xmlns:ma14="http://schemas.microsoft.com/office/mac/drawingml/2011/main" val="1"/>
             </a:ext>
           </a:extLst>
         </p:spPr>
@@ -5240,7 +5262,7 @@
           <a:effectLst/>
           <a:extLst>
             <a:ext uri="{C572A759-6A51-4108-AA02-DFA0A04FC94B}">
-              <ma14:wrappingTextBoxFlag xmlns:ma14="http://schemas.microsoft.com/office/mac/drawingml/2011/main" xmlns:a14="http://schemas.microsoft.com/office/drawing/2010/main" xmlns:m="http://schemas.openxmlformats.org/officeDocument/2006/math" xmlns="" val="1"/>
+              <ma14:wrappingTextBoxFlag xmlns="" xmlns:m="http://schemas.openxmlformats.org/officeDocument/2006/math" xmlns:a14="http://schemas.microsoft.com/office/drawing/2010/main" xmlns:ma14="http://schemas.microsoft.com/office/mac/drawingml/2011/main" val="1"/>
             </a:ext>
           </a:extLst>
         </p:spPr>
@@ -5544,7 +5566,7 @@
           <a:effectLst/>
           <a:extLst>
             <a:ext uri="{C572A759-6A51-4108-AA02-DFA0A04FC94B}">
-              <ma14:wrappingTextBoxFlag xmlns:ma14="http://schemas.microsoft.com/office/mac/drawingml/2011/main" xmlns:a14="http://schemas.microsoft.com/office/drawing/2010/main" xmlns:m="http://schemas.openxmlformats.org/officeDocument/2006/math" xmlns="" val="1"/>
+              <ma14:wrappingTextBoxFlag xmlns="" xmlns:m="http://schemas.openxmlformats.org/officeDocument/2006/math" xmlns:a14="http://schemas.microsoft.com/office/drawing/2010/main" xmlns:ma14="http://schemas.microsoft.com/office/mac/drawingml/2011/main" val="1"/>
             </a:ext>
           </a:extLst>
         </p:spPr>
@@ -6145,7 +6167,7 @@
           <a:effectLst/>
           <a:extLst>
             <a:ext uri="{C572A759-6A51-4108-AA02-DFA0A04FC94B}">
-              <ma14:wrappingTextBoxFlag xmlns:ma14="http://schemas.microsoft.com/office/mac/drawingml/2011/main" xmlns:a14="http://schemas.microsoft.com/office/drawing/2010/main" xmlns:m="http://schemas.openxmlformats.org/officeDocument/2006/math" xmlns="" val="1"/>
+              <ma14:wrappingTextBoxFlag xmlns="" xmlns:m="http://schemas.openxmlformats.org/officeDocument/2006/math" xmlns:a14="http://schemas.microsoft.com/office/drawing/2010/main" xmlns:ma14="http://schemas.microsoft.com/office/mac/drawingml/2011/main" val="1"/>
             </a:ext>
           </a:extLst>
         </p:spPr>
@@ -6270,7 +6292,7 @@
           </a:ln>
           <a:extLst>
             <a:ext uri="{C572A759-6A51-4108-AA02-DFA0A04FC94B}">
-              <ma14:wrappingTextBoxFlag xmlns:ma14="http://schemas.microsoft.com/office/mac/drawingml/2011/main" xmlns:a14="http://schemas.microsoft.com/office/drawing/2010/main" xmlns:m="http://schemas.openxmlformats.org/officeDocument/2006/math" xmlns="" val="1"/>
+              <ma14:wrappingTextBoxFlag xmlns="" xmlns:m="http://schemas.openxmlformats.org/officeDocument/2006/math" xmlns:a14="http://schemas.microsoft.com/office/drawing/2010/main" xmlns:ma14="http://schemas.microsoft.com/office/mac/drawingml/2011/main" val="1"/>
             </a:ext>
           </a:extLst>
         </p:spPr>
@@ -6509,7 +6531,7 @@
           <a:effectLst/>
           <a:extLst>
             <a:ext uri="{C572A759-6A51-4108-AA02-DFA0A04FC94B}">
-              <ma14:wrappingTextBoxFlag xmlns:ma14="http://schemas.microsoft.com/office/mac/drawingml/2011/main" xmlns:a14="http://schemas.microsoft.com/office/drawing/2010/main" xmlns:m="http://schemas.openxmlformats.org/officeDocument/2006/math" xmlns="" val="1"/>
+              <ma14:wrappingTextBoxFlag xmlns="" xmlns:m="http://schemas.openxmlformats.org/officeDocument/2006/math" xmlns:a14="http://schemas.microsoft.com/office/drawing/2010/main" xmlns:ma14="http://schemas.microsoft.com/office/mac/drawingml/2011/main" val="1"/>
             </a:ext>
           </a:extLst>
         </p:spPr>
@@ -6633,7 +6655,7 @@
           </a:ln>
           <a:extLst>
             <a:ext uri="{C572A759-6A51-4108-AA02-DFA0A04FC94B}">
-              <ma14:wrappingTextBoxFlag xmlns:ma14="http://schemas.microsoft.com/office/mac/drawingml/2011/main" xmlns:a14="http://schemas.microsoft.com/office/drawing/2010/main" xmlns:m="http://schemas.openxmlformats.org/officeDocument/2006/math" xmlns="" val="1"/>
+              <ma14:wrappingTextBoxFlag xmlns="" xmlns:m="http://schemas.openxmlformats.org/officeDocument/2006/math" xmlns:a14="http://schemas.microsoft.com/office/drawing/2010/main" xmlns:ma14="http://schemas.microsoft.com/office/mac/drawingml/2011/main" val="1"/>
             </a:ext>
           </a:extLst>
         </p:spPr>
@@ -6876,7 +6898,7 @@
           <a:effectLst/>
           <a:extLst>
             <a:ext uri="{C572A759-6A51-4108-AA02-DFA0A04FC94B}">
-              <ma14:wrappingTextBoxFlag xmlns:ma14="http://schemas.microsoft.com/office/mac/drawingml/2011/main" xmlns:a14="http://schemas.microsoft.com/office/drawing/2010/main" xmlns:m="http://schemas.openxmlformats.org/officeDocument/2006/math" xmlns="" val="1"/>
+              <ma14:wrappingTextBoxFlag xmlns="" xmlns:m="http://schemas.openxmlformats.org/officeDocument/2006/math" xmlns:a14="http://schemas.microsoft.com/office/drawing/2010/main" xmlns:ma14="http://schemas.microsoft.com/office/mac/drawingml/2011/main" val="1"/>
             </a:ext>
           </a:extLst>
         </p:spPr>
@@ -6900,8 +6922,13 @@
           <a:p>
             <a:r>
               <a:rPr lang="fr-FR" dirty="0"/>
-              <a:t>Okko Tolea</a:t>
+              <a:t>Alonso </a:t>
             </a:r>
+            <a:r>
+              <a:rPr lang="fr-FR" dirty="0" err="1"/>
+              <a:t>Calip</a:t>
+            </a:r>
+            <a:endParaRPr lang="fr-FR" dirty="0"/>
           </a:p>
           <a:p>
             <a:r>
@@ -6972,7 +6999,7 @@
           </p:cNvPicPr>
           <p:nvPr/>
         </p:nvPicPr>
-        <p:blipFill rotWithShape="1">
+        <p:blipFill>
           <a:blip r:embed="rId11">
             <a:extLst>
               <a:ext uri="{28A0092B-C50C-407E-A947-70E740481C1C}">
@@ -6980,7 +7007,7 @@
               </a:ext>
             </a:extLst>
           </a:blip>
-          <a:srcRect t="7849" b="7849"/>
+          <a:srcRect/>
           <a:stretch/>
         </p:blipFill>
         <p:spPr>
@@ -6999,7 +7026,7 @@
           </a:ln>
           <a:extLst>
             <a:ext uri="{C572A759-6A51-4108-AA02-DFA0A04FC94B}">
-              <ma14:wrappingTextBoxFlag xmlns:ma14="http://schemas.microsoft.com/office/mac/drawingml/2011/main" xmlns:a14="http://schemas.microsoft.com/office/drawing/2010/main" xmlns:m="http://schemas.openxmlformats.org/officeDocument/2006/math" xmlns="" val="1"/>
+              <ma14:wrappingTextBoxFlag xmlns="" xmlns:m="http://schemas.openxmlformats.org/officeDocument/2006/math" xmlns:a14="http://schemas.microsoft.com/office/drawing/2010/main" xmlns:ma14="http://schemas.microsoft.com/office/mac/drawingml/2011/main" val="1"/>
             </a:ext>
           </a:extLst>
         </p:spPr>
@@ -7242,7 +7269,7 @@
           <a:effectLst/>
           <a:extLst>
             <a:ext uri="{C572A759-6A51-4108-AA02-DFA0A04FC94B}">
-              <ma14:wrappingTextBoxFlag xmlns:ma14="http://schemas.microsoft.com/office/mac/drawingml/2011/main" xmlns:a14="http://schemas.microsoft.com/office/drawing/2010/main" xmlns:m="http://schemas.openxmlformats.org/officeDocument/2006/math" xmlns="" val="1"/>
+              <ma14:wrappingTextBoxFlag xmlns="" xmlns:m="http://schemas.openxmlformats.org/officeDocument/2006/math" xmlns:a14="http://schemas.microsoft.com/office/drawing/2010/main" xmlns:ma14="http://schemas.microsoft.com/office/mac/drawingml/2011/main" val="1"/>
             </a:ext>
           </a:extLst>
         </p:spPr>
@@ -7573,7 +7600,7 @@
           <a:effectLst/>
           <a:extLst>
             <a:ext uri="{C572A759-6A51-4108-AA02-DFA0A04FC94B}">
-              <ma14:wrappingTextBoxFlag xmlns:ma14="http://schemas.microsoft.com/office/mac/drawingml/2011/main" xmlns:a14="http://schemas.microsoft.com/office/drawing/2010/main" xmlns:m="http://schemas.openxmlformats.org/officeDocument/2006/math" xmlns="" val="1"/>
+              <ma14:wrappingTextBoxFlag xmlns="" xmlns:m="http://schemas.openxmlformats.org/officeDocument/2006/math" xmlns:a14="http://schemas.microsoft.com/office/drawing/2010/main" xmlns:ma14="http://schemas.microsoft.com/office/mac/drawingml/2011/main" val="1"/>
             </a:ext>
           </a:extLst>
         </p:spPr>
@@ -7904,7 +7931,7 @@
           <a:effectLst/>
           <a:extLst>
             <a:ext uri="{C572A759-6A51-4108-AA02-DFA0A04FC94B}">
-              <ma14:wrappingTextBoxFlag xmlns:ma14="http://schemas.microsoft.com/office/mac/drawingml/2011/main" xmlns:a14="http://schemas.microsoft.com/office/drawing/2010/main" xmlns:m="http://schemas.openxmlformats.org/officeDocument/2006/math" xmlns="" val="1"/>
+              <ma14:wrappingTextBoxFlag xmlns="" xmlns:m="http://schemas.openxmlformats.org/officeDocument/2006/math" xmlns:a14="http://schemas.microsoft.com/office/drawing/2010/main" xmlns:ma14="http://schemas.microsoft.com/office/mac/drawingml/2011/main" val="1"/>
             </a:ext>
           </a:extLst>
         </p:spPr>
@@ -8027,7 +8054,7 @@
           </a:ln>
           <a:extLst>
             <a:ext uri="{C572A759-6A51-4108-AA02-DFA0A04FC94B}">
-              <ma14:wrappingTextBoxFlag xmlns:ma14="http://schemas.microsoft.com/office/mac/drawingml/2011/main" xmlns:a14="http://schemas.microsoft.com/office/drawing/2010/main" xmlns:m="http://schemas.openxmlformats.org/officeDocument/2006/math" xmlns="" val="1"/>
+              <ma14:wrappingTextBoxFlag xmlns="" xmlns:m="http://schemas.openxmlformats.org/officeDocument/2006/math" xmlns:a14="http://schemas.microsoft.com/office/drawing/2010/main" xmlns:ma14="http://schemas.microsoft.com/office/mac/drawingml/2011/main" val="1"/>
             </a:ext>
           </a:extLst>
         </p:spPr>
@@ -8270,7 +8297,7 @@
           <a:effectLst/>
           <a:extLst>
             <a:ext uri="{C572A759-6A51-4108-AA02-DFA0A04FC94B}">
-              <ma14:wrappingTextBoxFlag xmlns:ma14="http://schemas.microsoft.com/office/mac/drawingml/2011/main" xmlns:a14="http://schemas.microsoft.com/office/drawing/2010/main" xmlns:m="http://schemas.openxmlformats.org/officeDocument/2006/math" xmlns="" val="1"/>
+              <ma14:wrappingTextBoxFlag xmlns="" xmlns:m="http://schemas.openxmlformats.org/officeDocument/2006/math" xmlns:a14="http://schemas.microsoft.com/office/drawing/2010/main" xmlns:ma14="http://schemas.microsoft.com/office/mac/drawingml/2011/main" val="1"/>
             </a:ext>
           </a:extLst>
         </p:spPr>
@@ -8395,7 +8422,7 @@
           </a:ln>
           <a:extLst>
             <a:ext uri="{C572A759-6A51-4108-AA02-DFA0A04FC94B}">
-              <ma14:wrappingTextBoxFlag xmlns:ma14="http://schemas.microsoft.com/office/mac/drawingml/2011/main" xmlns:a14="http://schemas.microsoft.com/office/drawing/2010/main" xmlns:m="http://schemas.openxmlformats.org/officeDocument/2006/math" xmlns="" val="1"/>
+              <ma14:wrappingTextBoxFlag xmlns="" xmlns:m="http://schemas.openxmlformats.org/officeDocument/2006/math" xmlns:a14="http://schemas.microsoft.com/office/drawing/2010/main" xmlns:ma14="http://schemas.microsoft.com/office/mac/drawingml/2011/main" val="1"/>
             </a:ext>
           </a:extLst>
         </p:spPr>
@@ -8808,7 +8835,7 @@
             <a:effectLst/>
             <a:extLst>
               <a:ext uri="{C572A759-6A51-4108-AA02-DFA0A04FC94B}">
-                <ma14:wrappingTextBoxFlag xmlns:ma14="http://schemas.microsoft.com/office/mac/drawingml/2011/main" xmlns:a14="http://schemas.microsoft.com/office/drawing/2010/main" xmlns:m="http://schemas.openxmlformats.org/officeDocument/2006/math" xmlns="" val="1"/>
+                <ma14:wrappingTextBoxFlag xmlns="" xmlns:m="http://schemas.openxmlformats.org/officeDocument/2006/math" xmlns:a14="http://schemas.microsoft.com/office/drawing/2010/main" xmlns:ma14="http://schemas.microsoft.com/office/mac/drawingml/2011/main" val="1"/>
               </a:ext>
             </a:extLst>
           </p:spPr>
@@ -8935,7 +8962,7 @@
             <a:effectLst/>
             <a:extLst>
               <a:ext uri="{C572A759-6A51-4108-AA02-DFA0A04FC94B}">
-                <ma14:wrappingTextBoxFlag xmlns:ma14="http://schemas.microsoft.com/office/mac/drawingml/2011/main" xmlns:a14="http://schemas.microsoft.com/office/drawing/2010/main" xmlns:m="http://schemas.openxmlformats.org/officeDocument/2006/math" xmlns="" val="1"/>
+                <ma14:wrappingTextBoxFlag xmlns="" xmlns:m="http://schemas.openxmlformats.org/officeDocument/2006/math" xmlns:a14="http://schemas.microsoft.com/office/drawing/2010/main" xmlns:ma14="http://schemas.microsoft.com/office/mac/drawingml/2011/main" val="1"/>
               </a:ext>
             </a:extLst>
           </p:spPr>
@@ -9197,7 +9224,7 @@
             <a:effectLst/>
             <a:extLst>
               <a:ext uri="{C572A759-6A51-4108-AA02-DFA0A04FC94B}">
-                <ma14:wrappingTextBoxFlag xmlns:ma14="http://schemas.microsoft.com/office/mac/drawingml/2011/main" xmlns:a14="http://schemas.microsoft.com/office/drawing/2010/main" xmlns:m="http://schemas.openxmlformats.org/officeDocument/2006/math" xmlns="" val="1"/>
+                <ma14:wrappingTextBoxFlag xmlns="" xmlns:m="http://schemas.openxmlformats.org/officeDocument/2006/math" xmlns:a14="http://schemas.microsoft.com/office/drawing/2010/main" xmlns:ma14="http://schemas.microsoft.com/office/mac/drawingml/2011/main" val="1"/>
               </a:ext>
             </a:extLst>
           </p:spPr>
@@ -9322,7 +9349,7 @@
             </a:ln>
             <a:extLst>
               <a:ext uri="{C572A759-6A51-4108-AA02-DFA0A04FC94B}">
-                <ma14:wrappingTextBoxFlag xmlns:ma14="http://schemas.microsoft.com/office/mac/drawingml/2011/main" xmlns:a14="http://schemas.microsoft.com/office/drawing/2010/main" xmlns:m="http://schemas.openxmlformats.org/officeDocument/2006/math" xmlns="" val="1"/>
+                <ma14:wrappingTextBoxFlag xmlns="" xmlns:m="http://schemas.openxmlformats.org/officeDocument/2006/math" xmlns:a14="http://schemas.microsoft.com/office/drawing/2010/main" xmlns:ma14="http://schemas.microsoft.com/office/mac/drawingml/2011/main" val="1"/>
               </a:ext>
             </a:extLst>
           </p:spPr>
@@ -9584,7 +9611,7 @@
             <a:effectLst/>
             <a:extLst>
               <a:ext uri="{C572A759-6A51-4108-AA02-DFA0A04FC94B}">
-                <ma14:wrappingTextBoxFlag xmlns:ma14="http://schemas.microsoft.com/office/mac/drawingml/2011/main" xmlns:a14="http://schemas.microsoft.com/office/drawing/2010/main" xmlns:m="http://schemas.openxmlformats.org/officeDocument/2006/math" xmlns="" val="1"/>
+                <ma14:wrappingTextBoxFlag xmlns="" xmlns:m="http://schemas.openxmlformats.org/officeDocument/2006/math" xmlns:a14="http://schemas.microsoft.com/office/drawing/2010/main" xmlns:ma14="http://schemas.microsoft.com/office/mac/drawingml/2011/main" val="1"/>
               </a:ext>
             </a:extLst>
           </p:spPr>
@@ -9709,7 +9736,7 @@
             </a:ln>
             <a:extLst>
               <a:ext uri="{C572A759-6A51-4108-AA02-DFA0A04FC94B}">
-                <ma14:wrappingTextBoxFlag xmlns:ma14="http://schemas.microsoft.com/office/mac/drawingml/2011/main" xmlns:a14="http://schemas.microsoft.com/office/drawing/2010/main" xmlns:m="http://schemas.openxmlformats.org/officeDocument/2006/math" xmlns="" val="1"/>
+                <ma14:wrappingTextBoxFlag xmlns="" xmlns:m="http://schemas.openxmlformats.org/officeDocument/2006/math" xmlns:a14="http://schemas.microsoft.com/office/drawing/2010/main" xmlns:ma14="http://schemas.microsoft.com/office/mac/drawingml/2011/main" val="1"/>
               </a:ext>
             </a:extLst>
           </p:spPr>
@@ -9971,7 +9998,7 @@
             <a:effectLst/>
             <a:extLst>
               <a:ext uri="{C572A759-6A51-4108-AA02-DFA0A04FC94B}">
-                <ma14:wrappingTextBoxFlag xmlns:ma14="http://schemas.microsoft.com/office/mac/drawingml/2011/main" xmlns:a14="http://schemas.microsoft.com/office/drawing/2010/main" xmlns:m="http://schemas.openxmlformats.org/officeDocument/2006/math" xmlns="" val="1"/>
+                <ma14:wrappingTextBoxFlag xmlns="" xmlns:m="http://schemas.openxmlformats.org/officeDocument/2006/math" xmlns:a14="http://schemas.microsoft.com/office/drawing/2010/main" xmlns:ma14="http://schemas.microsoft.com/office/mac/drawingml/2011/main" val="1"/>
               </a:ext>
             </a:extLst>
           </p:spPr>
@@ -10096,7 +10123,7 @@
             </a:ln>
             <a:extLst>
               <a:ext uri="{C572A759-6A51-4108-AA02-DFA0A04FC94B}">
-                <ma14:wrappingTextBoxFlag xmlns:ma14="http://schemas.microsoft.com/office/mac/drawingml/2011/main" xmlns:a14="http://schemas.microsoft.com/office/drawing/2010/main" xmlns:m="http://schemas.openxmlformats.org/officeDocument/2006/math" xmlns="" val="1"/>
+                <ma14:wrappingTextBoxFlag xmlns="" xmlns:m="http://schemas.openxmlformats.org/officeDocument/2006/math" xmlns:a14="http://schemas.microsoft.com/office/drawing/2010/main" xmlns:ma14="http://schemas.microsoft.com/office/mac/drawingml/2011/main" val="1"/>
               </a:ext>
             </a:extLst>
           </p:spPr>
@@ -10340,7 +10367,7 @@
           <a:effectLst/>
           <a:extLst>
             <a:ext uri="{C572A759-6A51-4108-AA02-DFA0A04FC94B}">
-              <ma14:wrappingTextBoxFlag xmlns:ma14="http://schemas.microsoft.com/office/mac/drawingml/2011/main" xmlns:a14="http://schemas.microsoft.com/office/drawing/2010/main" xmlns:m="http://schemas.openxmlformats.org/officeDocument/2006/math" xmlns="" val="1"/>
+              <ma14:wrappingTextBoxFlag xmlns="" xmlns:m="http://schemas.openxmlformats.org/officeDocument/2006/math" xmlns:a14="http://schemas.microsoft.com/office/drawing/2010/main" xmlns:ma14="http://schemas.microsoft.com/office/mac/drawingml/2011/main" val="1"/>
             </a:ext>
           </a:extLst>
         </p:spPr>
@@ -10457,7 +10484,7 @@
           </a:ln>
           <a:extLst>
             <a:ext uri="{C572A759-6A51-4108-AA02-DFA0A04FC94B}">
-              <ma14:wrappingTextBoxFlag xmlns:ma14="http://schemas.microsoft.com/office/mac/drawingml/2011/main" xmlns:a14="http://schemas.microsoft.com/office/drawing/2010/main" xmlns:m="http://schemas.openxmlformats.org/officeDocument/2006/math" xmlns="" val="1"/>
+              <ma14:wrappingTextBoxFlag xmlns="" xmlns:m="http://schemas.openxmlformats.org/officeDocument/2006/math" xmlns:a14="http://schemas.microsoft.com/office/drawing/2010/main" xmlns:ma14="http://schemas.microsoft.com/office/mac/drawingml/2011/main" val="1"/>
             </a:ext>
           </a:extLst>
         </p:spPr>
@@ -10653,7 +10680,7 @@
           </a:ln>
           <a:extLst>
             <a:ext uri="{C572A759-6A51-4108-AA02-DFA0A04FC94B}">
-              <ma14:wrappingTextBoxFlag xmlns:ma14="http://schemas.microsoft.com/office/mac/drawingml/2011/main" xmlns:a14="http://schemas.microsoft.com/office/drawing/2010/main" xmlns:m="http://schemas.openxmlformats.org/officeDocument/2006/math" xmlns="" val="1"/>
+              <ma14:wrappingTextBoxFlag xmlns="" xmlns:m="http://schemas.openxmlformats.org/officeDocument/2006/math" xmlns:a14="http://schemas.microsoft.com/office/drawing/2010/main" xmlns:ma14="http://schemas.microsoft.com/office/mac/drawingml/2011/main" val="1"/>
             </a:ext>
           </a:extLst>
         </p:spPr>
@@ -10936,7 +10963,7 @@
           <a:effectLst/>
           <a:extLst>
             <a:ext uri="{C572A759-6A51-4108-AA02-DFA0A04FC94B}">
-              <ma14:wrappingTextBoxFlag xmlns:ma14="http://schemas.microsoft.com/office/mac/drawingml/2011/main" xmlns:a14="http://schemas.microsoft.com/office/drawing/2010/main" xmlns:m="http://schemas.openxmlformats.org/officeDocument/2006/math" xmlns="" val="1"/>
+              <ma14:wrappingTextBoxFlag xmlns="" xmlns:m="http://schemas.openxmlformats.org/officeDocument/2006/math" xmlns:a14="http://schemas.microsoft.com/office/drawing/2010/main" xmlns:ma14="http://schemas.microsoft.com/office/mac/drawingml/2011/main" val="1"/>
             </a:ext>
           </a:extLst>
         </p:spPr>
@@ -11061,7 +11088,7 @@
           </a:ln>
           <a:extLst>
             <a:ext uri="{C572A759-6A51-4108-AA02-DFA0A04FC94B}">
-              <ma14:wrappingTextBoxFlag xmlns:ma14="http://schemas.microsoft.com/office/mac/drawingml/2011/main" xmlns:a14="http://schemas.microsoft.com/office/drawing/2010/main" xmlns:m="http://schemas.openxmlformats.org/officeDocument/2006/math" xmlns="" val="1"/>
+              <ma14:wrappingTextBoxFlag xmlns="" xmlns:m="http://schemas.openxmlformats.org/officeDocument/2006/math" xmlns:a14="http://schemas.microsoft.com/office/drawing/2010/main" xmlns:ma14="http://schemas.microsoft.com/office/mac/drawingml/2011/main" val="1"/>
             </a:ext>
           </a:extLst>
         </p:spPr>
@@ -11304,7 +11331,7 @@
           <a:effectLst/>
           <a:extLst>
             <a:ext uri="{C572A759-6A51-4108-AA02-DFA0A04FC94B}">
-              <ma14:wrappingTextBoxFlag xmlns:ma14="http://schemas.microsoft.com/office/mac/drawingml/2011/main" xmlns:a14="http://schemas.microsoft.com/office/drawing/2010/main" xmlns:m="http://schemas.openxmlformats.org/officeDocument/2006/math" xmlns="" val="1"/>
+              <ma14:wrappingTextBoxFlag xmlns="" xmlns:m="http://schemas.openxmlformats.org/officeDocument/2006/math" xmlns:a14="http://schemas.microsoft.com/office/drawing/2010/main" xmlns:ma14="http://schemas.microsoft.com/office/mac/drawingml/2011/main" val="1"/>
             </a:ext>
           </a:extLst>
         </p:spPr>
@@ -11427,7 +11454,7 @@
           </a:ln>
           <a:extLst>
             <a:ext uri="{C572A759-6A51-4108-AA02-DFA0A04FC94B}">
-              <ma14:wrappingTextBoxFlag xmlns:ma14="http://schemas.microsoft.com/office/mac/drawingml/2011/main" xmlns:a14="http://schemas.microsoft.com/office/drawing/2010/main" xmlns:m="http://schemas.openxmlformats.org/officeDocument/2006/math" xmlns="" val="1"/>
+              <ma14:wrappingTextBoxFlag xmlns="" xmlns:m="http://schemas.openxmlformats.org/officeDocument/2006/math" xmlns:a14="http://schemas.microsoft.com/office/drawing/2010/main" xmlns:ma14="http://schemas.microsoft.com/office/mac/drawingml/2011/main" val="1"/>
             </a:ext>
           </a:extLst>
         </p:spPr>
@@ -11770,7 +11797,7 @@
           <a:effectLst/>
           <a:extLst>
             <a:ext uri="{C572A759-6A51-4108-AA02-DFA0A04FC94B}">
-              <ma14:wrappingTextBoxFlag xmlns:ma14="http://schemas.microsoft.com/office/mac/drawingml/2011/main" xmlns:a14="http://schemas.microsoft.com/office/drawing/2010/main" xmlns:m="http://schemas.openxmlformats.org/officeDocument/2006/math" xmlns="" val="1"/>
+              <ma14:wrappingTextBoxFlag xmlns="" xmlns:m="http://schemas.openxmlformats.org/officeDocument/2006/math" xmlns:a14="http://schemas.microsoft.com/office/drawing/2010/main" xmlns:ma14="http://schemas.microsoft.com/office/mac/drawingml/2011/main" val="1"/>
             </a:ext>
           </a:extLst>
         </p:spPr>
@@ -12091,7 +12118,7 @@
           <a:effectLst/>
           <a:extLst>
             <a:ext uri="{C572A759-6A51-4108-AA02-DFA0A04FC94B}">
-              <ma14:wrappingTextBoxFlag xmlns:ma14="http://schemas.microsoft.com/office/mac/drawingml/2011/main" xmlns:a14="http://schemas.microsoft.com/office/drawing/2010/main" xmlns:m="http://schemas.openxmlformats.org/officeDocument/2006/math" xmlns="" val="1"/>
+              <ma14:wrappingTextBoxFlag xmlns="" xmlns:m="http://schemas.openxmlformats.org/officeDocument/2006/math" xmlns:a14="http://schemas.microsoft.com/office/drawing/2010/main" xmlns:ma14="http://schemas.microsoft.com/office/mac/drawingml/2011/main" val="1"/>
             </a:ext>
           </a:extLst>
         </p:spPr>
@@ -12225,7 +12252,7 @@
           </a:ln>
           <a:extLst>
             <a:ext uri="{C572A759-6A51-4108-AA02-DFA0A04FC94B}">
-              <ma14:wrappingTextBoxFlag xmlns:ma14="http://schemas.microsoft.com/office/mac/drawingml/2011/main" xmlns:a14="http://schemas.microsoft.com/office/drawing/2010/main" xmlns:m="http://schemas.openxmlformats.org/officeDocument/2006/math" xmlns="" val="1"/>
+              <ma14:wrappingTextBoxFlag xmlns="" xmlns:m="http://schemas.openxmlformats.org/officeDocument/2006/math" xmlns:a14="http://schemas.microsoft.com/office/drawing/2010/main" xmlns:ma14="http://schemas.microsoft.com/office/mac/drawingml/2011/main" val="1"/>
             </a:ext>
           </a:extLst>
         </p:spPr>
@@ -12468,7 +12495,7 @@
           <a:effectLst/>
           <a:extLst>
             <a:ext uri="{C572A759-6A51-4108-AA02-DFA0A04FC94B}">
-              <ma14:wrappingTextBoxFlag xmlns:ma14="http://schemas.microsoft.com/office/mac/drawingml/2011/main" xmlns:a14="http://schemas.microsoft.com/office/drawing/2010/main" xmlns:m="http://schemas.openxmlformats.org/officeDocument/2006/math" xmlns="" val="1"/>
+              <ma14:wrappingTextBoxFlag xmlns="" xmlns:m="http://schemas.openxmlformats.org/officeDocument/2006/math" xmlns:a14="http://schemas.microsoft.com/office/drawing/2010/main" xmlns:ma14="http://schemas.microsoft.com/office/mac/drawingml/2011/main" val="1"/>
             </a:ext>
           </a:extLst>
         </p:spPr>
@@ -12591,7 +12618,7 @@
           </a:ln>
           <a:extLst>
             <a:ext uri="{C572A759-6A51-4108-AA02-DFA0A04FC94B}">
-              <ma14:wrappingTextBoxFlag xmlns:ma14="http://schemas.microsoft.com/office/mac/drawingml/2011/main" xmlns:a14="http://schemas.microsoft.com/office/drawing/2010/main" xmlns:m="http://schemas.openxmlformats.org/officeDocument/2006/math" xmlns="" val="1"/>
+              <ma14:wrappingTextBoxFlag xmlns="" xmlns:m="http://schemas.openxmlformats.org/officeDocument/2006/math" xmlns:a14="http://schemas.microsoft.com/office/drawing/2010/main" xmlns:ma14="http://schemas.microsoft.com/office/mac/drawingml/2011/main" val="1"/>
             </a:ext>
           </a:extLst>
         </p:spPr>
@@ -12647,10 +12674,10 @@
       </p:pic>
       <p:pic>
         <p:nvPicPr>
-          <p:cNvPr id="12" name="Picture 11">
+          <p:cNvPr id="21" name="Picture 20" descr="A brown cowboy hat&#10;&#10;Description automatically generated with low confidence">
             <a:extLst>
               <a:ext uri="{FF2B5EF4-FFF2-40B4-BE49-F238E27FC236}">
-                <a16:creationId xmlns:a16="http://schemas.microsoft.com/office/drawing/2014/main" id="{B64A556E-740D-40D7-9A31-5B78260E85C3}"/>
+                <a16:creationId xmlns:a16="http://schemas.microsoft.com/office/drawing/2014/main" id="{0395B0B0-BA44-40C6-BDBF-4546D2479EE3}"/>
               </a:ext>
             </a:extLst>
           </p:cNvPr>
@@ -12672,69 +12699,11 @@
               </a:clrTo>
             </a:clrChange>
             <a:extLst>
-              <a:ext uri="{BEBA8EAE-BF5A-486C-A8C5-ECC9F3942E4B}">
-                <a14:imgProps xmlns:a14="http://schemas.microsoft.com/office/drawing/2010/main">
-                  <a14:imgLayer r:embed="rId28">
-                    <a14:imgEffect>
-                      <a14:brightnessContrast bright="20000"/>
-                    </a14:imgEffect>
-                  </a14:imgLayer>
-                </a14:imgProps>
-              </a:ext>
               <a:ext uri="{28A0092B-C50C-407E-A947-70E740481C1C}">
                 <a14:useLocalDpi xmlns:a14="http://schemas.microsoft.com/office/drawing/2010/main" val="0"/>
               </a:ext>
               <a:ext uri="{837473B0-CC2E-450A-ABE3-18F120FF3D39}">
-                <a1611:picAttrSrcUrl xmlns:a1611="http://schemas.microsoft.com/office/drawing/2016/11/main" r:id="rId29"/>
-              </a:ext>
-            </a:extLst>
-          </a:blip>
-          <a:stretch>
-            <a:fillRect/>
-          </a:stretch>
-        </p:blipFill>
-        <p:spPr>
-          <a:xfrm>
-            <a:off x="4162051" y="1225131"/>
-            <a:ext cx="1648141" cy="1648141"/>
-          </a:xfrm>
-          <a:prstGeom prst="rect">
-            <a:avLst/>
-          </a:prstGeom>
-        </p:spPr>
-      </p:pic>
-      <p:pic>
-        <p:nvPicPr>
-          <p:cNvPr id="21" name="Picture 20" descr="A brown cowboy hat&#10;&#10;Description automatically generated with low confidence">
-            <a:extLst>
-              <a:ext uri="{FF2B5EF4-FFF2-40B4-BE49-F238E27FC236}">
-                <a16:creationId xmlns:a16="http://schemas.microsoft.com/office/drawing/2014/main" id="{0395B0B0-BA44-40C6-BDBF-4546D2479EE3}"/>
-              </a:ext>
-            </a:extLst>
-          </p:cNvPr>
-          <p:cNvPicPr>
-            <a:picLocks noChangeAspect="1"/>
-          </p:cNvPicPr>
-          <p:nvPr/>
-        </p:nvPicPr>
-        <p:blipFill>
-          <a:blip r:embed="rId30">
-            <a:clrChange>
-              <a:clrFrom>
-                <a:srgbClr val="FFFFFF"/>
-              </a:clrFrom>
-              <a:clrTo>
-                <a:srgbClr val="FFFFFF">
-                  <a:alpha val="0"/>
-                </a:srgbClr>
-              </a:clrTo>
-            </a:clrChange>
-            <a:extLst>
-              <a:ext uri="{28A0092B-C50C-407E-A947-70E740481C1C}">
-                <a14:useLocalDpi xmlns:a14="http://schemas.microsoft.com/office/drawing/2010/main" val="0"/>
-              </a:ext>
-              <a:ext uri="{837473B0-CC2E-450A-ABE3-18F120FF3D39}">
-                <a1611:picAttrSrcUrl xmlns:a1611="http://schemas.microsoft.com/office/drawing/2016/11/main" r:id="rId31"/>
+                <a1611:picAttrSrcUrl xmlns:a1611="http://schemas.microsoft.com/office/drawing/2016/11/main" r:id="rId28"/>
               </a:ext>
             </a:extLst>
           </a:blip>
@@ -12767,7 +12736,7 @@
           <p:nvPr/>
         </p:nvPicPr>
         <p:blipFill>
-          <a:blip r:embed="rId32">
+          <a:blip r:embed="rId29">
             <a:extLst>
               <a:ext uri="{28A0092B-C50C-407E-A947-70E740481C1C}">
                 <a14:useLocalDpi xmlns:a14="http://schemas.microsoft.com/office/drawing/2010/main" val="0"/>
@@ -12803,7 +12772,7 @@
           <p:nvPr/>
         </p:nvPicPr>
         <p:blipFill>
-          <a:blip r:embed="rId33">
+          <a:blip r:embed="rId30">
             <a:clrChange>
               <a:clrFrom>
                 <a:srgbClr val="000000"/>

</xml_diff>

<commit_message>
Leadership 2 Image Update
</commit_message>
<xml_diff>
--- a/images/alliance-leadership/Brave-Leadership 2.pptx
+++ b/images/alliance-leadership/Brave-Leadership 2.pptx
@@ -333,7 +333,7 @@
 <file path=ppt/revisionInfo.xml><?xml version="1.0" encoding="utf-8"?>
 <p1510:revInfo xmlns:a="http://schemas.openxmlformats.org/drawingml/2006/main" xmlns:r="http://schemas.openxmlformats.org/officeDocument/2006/relationships" xmlns:p1510="http://schemas.microsoft.com/office/powerpoint/2015/10/main">
   <p1510:revLst>
-    <p1510:client id="{9344AE72-F363-428B-B7F1-1C064A3A24DF}" v="127" dt="2021-12-23T19:24:38.358"/>
+    <p1510:client id="{9344AE72-F363-428B-B7F1-1C064A3A24DF}" v="142" dt="2021-12-23T19:42:09.158"/>
   </p1510:revLst>
 </p1510:revInfo>
 </file>
@@ -439,22 +439,38 @@
   <pc:docChgLst>
     <pc:chgData name="Aiden Jepson" userId="27ac3319768fac1a" providerId="LiveId" clId="{9344AE72-F363-428B-B7F1-1C064A3A24DF}"/>
     <pc:docChg chg="undo redo custSel modSld">
-      <pc:chgData name="Aiden Jepson" userId="27ac3319768fac1a" providerId="LiveId" clId="{9344AE72-F363-428B-B7F1-1C064A3A24DF}" dt="2021-12-23T19:25:06.478" v="267" actId="1076"/>
+      <pc:chgData name="Aiden Jepson" userId="27ac3319768fac1a" providerId="LiveId" clId="{9344AE72-F363-428B-B7F1-1C064A3A24DF}" dt="2021-12-23T19:45:04.887" v="387" actId="688"/>
       <pc:docMkLst>
         <pc:docMk/>
       </pc:docMkLst>
       <pc:sldChg chg="addSp delSp modSp mod">
-        <pc:chgData name="Aiden Jepson" userId="27ac3319768fac1a" providerId="LiveId" clId="{9344AE72-F363-428B-B7F1-1C064A3A24DF}" dt="2021-12-23T19:25:06.478" v="267" actId="1076"/>
+        <pc:chgData name="Aiden Jepson" userId="27ac3319768fac1a" providerId="LiveId" clId="{9344AE72-F363-428B-B7F1-1C064A3A24DF}" dt="2021-12-23T19:45:04.887" v="387" actId="688"/>
         <pc:sldMkLst>
           <pc:docMk/>
           <pc:sldMk cId="180280424" sldId="326"/>
         </pc:sldMkLst>
+        <pc:spChg chg="add del mod">
+          <ac:chgData name="Aiden Jepson" userId="27ac3319768fac1a" providerId="LiveId" clId="{9344AE72-F363-428B-B7F1-1C064A3A24DF}" dt="2021-12-23T19:37:57.758" v="302" actId="478"/>
+          <ac:spMkLst>
+            <pc:docMk/>
+            <pc:sldMk cId="180280424" sldId="326"/>
+            <ac:spMk id="12" creationId="{B7ED71B9-7300-4CE3-8E0E-EFDD067DD9E1}"/>
+          </ac:spMkLst>
+        </pc:spChg>
         <pc:spChg chg="add del mod">
           <ac:chgData name="Aiden Jepson" userId="27ac3319768fac1a" providerId="LiveId" clId="{9344AE72-F363-428B-B7F1-1C064A3A24DF}" dt="2021-11-30T22:33:07.380" v="171"/>
           <ac:spMkLst>
             <pc:docMk/>
             <pc:sldMk cId="180280424" sldId="326"/>
             <ac:spMk id="19" creationId="{608F4391-B634-4647-8A0B-8ECA34A121BD}"/>
+          </ac:spMkLst>
+        </pc:spChg>
+        <pc:spChg chg="add mod">
+          <ac:chgData name="Aiden Jepson" userId="27ac3319768fac1a" providerId="LiveId" clId="{9344AE72-F363-428B-B7F1-1C064A3A24DF}" dt="2021-12-23T19:41:29.535" v="355" actId="1076"/>
+          <ac:spMkLst>
+            <pc:docMk/>
+            <pc:sldMk cId="180280424" sldId="326"/>
+            <ac:spMk id="19" creationId="{8BC4D36B-B8CC-4DCB-9A40-860E86361382}"/>
           </ac:spMkLst>
         </pc:spChg>
         <pc:spChg chg="mod">
@@ -497,12 +513,116 @@
             <ac:spMk id="145" creationId="{5180372D-6DC6-4818-9342-15A71A472830}"/>
           </ac:spMkLst>
         </pc:spChg>
+        <pc:spChg chg="add del mod">
+          <ac:chgData name="Aiden Jepson" userId="27ac3319768fac1a" providerId="LiveId" clId="{9344AE72-F363-428B-B7F1-1C064A3A24DF}" dt="2021-12-23T19:37:57.310" v="301" actId="478"/>
+          <ac:spMkLst>
+            <pc:docMk/>
+            <pc:sldMk cId="180280424" sldId="326"/>
+            <ac:spMk id="155" creationId="{B134B951-46F1-4957-93D9-3EF8E6709B7F}"/>
+          </ac:spMkLst>
+        </pc:spChg>
+        <pc:spChg chg="add del mod">
+          <ac:chgData name="Aiden Jepson" userId="27ac3319768fac1a" providerId="LiveId" clId="{9344AE72-F363-428B-B7F1-1C064A3A24DF}" dt="2021-12-23T19:37:58.538" v="303" actId="478"/>
+          <ac:spMkLst>
+            <pc:docMk/>
+            <pc:sldMk cId="180280424" sldId="326"/>
+            <ac:spMk id="156" creationId="{39159526-3B8E-42B0-8536-99BEA12FC17E}"/>
+          </ac:spMkLst>
+        </pc:spChg>
+        <pc:spChg chg="add mod">
+          <ac:chgData name="Aiden Jepson" userId="27ac3319768fac1a" providerId="LiveId" clId="{9344AE72-F363-428B-B7F1-1C064A3A24DF}" dt="2021-12-23T19:41:22.717" v="354" actId="1076"/>
+          <ac:spMkLst>
+            <pc:docMk/>
+            <pc:sldMk cId="180280424" sldId="326"/>
+            <ac:spMk id="157" creationId="{26660013-C9FD-4331-9EDD-7D0ACEFC8DFC}"/>
+          </ac:spMkLst>
+        </pc:spChg>
+        <pc:spChg chg="add mod">
+          <ac:chgData name="Aiden Jepson" userId="27ac3319768fac1a" providerId="LiveId" clId="{9344AE72-F363-428B-B7F1-1C064A3A24DF}" dt="2021-12-23T19:41:08.351" v="353" actId="1076"/>
+          <ac:spMkLst>
+            <pc:docMk/>
+            <pc:sldMk cId="180280424" sldId="326"/>
+            <ac:spMk id="158" creationId="{2CCA6BAB-F5D2-48A6-9CA8-90C264336197}"/>
+          </ac:spMkLst>
+        </pc:spChg>
+        <pc:spChg chg="add mod">
+          <ac:chgData name="Aiden Jepson" userId="27ac3319768fac1a" providerId="LiveId" clId="{9344AE72-F363-428B-B7F1-1C064A3A24DF}" dt="2021-12-23T19:44:50.330" v="386" actId="688"/>
+          <ac:spMkLst>
+            <pc:docMk/>
+            <pc:sldMk cId="180280424" sldId="326"/>
+            <ac:spMk id="179" creationId="{78E8A4FD-E637-4136-8C54-D3508090393C}"/>
+          </ac:spMkLst>
+        </pc:spChg>
+        <pc:spChg chg="add mod">
+          <ac:chgData name="Aiden Jepson" userId="27ac3319768fac1a" providerId="LiveId" clId="{9344AE72-F363-428B-B7F1-1C064A3A24DF}" dt="2021-12-23T19:43:12.056" v="371" actId="688"/>
+          <ac:spMkLst>
+            <pc:docMk/>
+            <pc:sldMk cId="180280424" sldId="326"/>
+            <ac:spMk id="180" creationId="{9C20FD4D-2919-4AAB-A352-81BEF9B64947}"/>
+          </ac:spMkLst>
+        </pc:spChg>
+        <pc:spChg chg="add mod">
+          <ac:chgData name="Aiden Jepson" userId="27ac3319768fac1a" providerId="LiveId" clId="{9344AE72-F363-428B-B7F1-1C064A3A24DF}" dt="2021-12-23T19:44:38.405" v="380" actId="688"/>
+          <ac:spMkLst>
+            <pc:docMk/>
+            <pc:sldMk cId="180280424" sldId="326"/>
+            <ac:spMk id="181" creationId="{3A8A4196-4027-474A-B68E-8F61BA375D64}"/>
+          </ac:spMkLst>
+        </pc:spChg>
+        <pc:spChg chg="add mod">
+          <ac:chgData name="Aiden Jepson" userId="27ac3319768fac1a" providerId="LiveId" clId="{9344AE72-F363-428B-B7F1-1C064A3A24DF}" dt="2021-12-23T19:44:43.163" v="382" actId="1076"/>
+          <ac:spMkLst>
+            <pc:docMk/>
+            <pc:sldMk cId="180280424" sldId="326"/>
+            <ac:spMk id="182" creationId="{DA43734A-4EDA-4EF8-AE8D-9E84A0206C2A}"/>
+          </ac:spMkLst>
+        </pc:spChg>
+        <pc:spChg chg="add mod">
+          <ac:chgData name="Aiden Jepson" userId="27ac3319768fac1a" providerId="LiveId" clId="{9344AE72-F363-428B-B7F1-1C064A3A24DF}" dt="2021-12-23T19:43:20.786" v="376" actId="688"/>
+          <ac:spMkLst>
+            <pc:docMk/>
+            <pc:sldMk cId="180280424" sldId="326"/>
+            <ac:spMk id="183" creationId="{8BB0E08F-2AAE-4C1B-B005-FA1CDF269971}"/>
+          </ac:spMkLst>
+        </pc:spChg>
+        <pc:spChg chg="add del mod">
+          <ac:chgData name="Aiden Jepson" userId="27ac3319768fac1a" providerId="LiveId" clId="{9344AE72-F363-428B-B7F1-1C064A3A24DF}" dt="2021-12-23T19:45:04.887" v="387" actId="688"/>
+          <ac:spMkLst>
+            <pc:docMk/>
+            <pc:sldMk cId="180280424" sldId="326"/>
+            <ac:spMk id="184" creationId="{4BE61E34-0882-47FE-B633-357882824437}"/>
+          </ac:spMkLst>
+        </pc:spChg>
+        <pc:spChg chg="add mod">
+          <ac:chgData name="Aiden Jepson" userId="27ac3319768fac1a" providerId="LiveId" clId="{9344AE72-F363-428B-B7F1-1C064A3A24DF}" dt="2021-12-23T19:42:08.494" v="368" actId="1076"/>
+          <ac:spMkLst>
+            <pc:docMk/>
+            <pc:sldMk cId="180280424" sldId="326"/>
+            <ac:spMk id="185" creationId="{EB9C8C8D-FF9A-43C5-9A1D-C21C2111822F}"/>
+          </ac:spMkLst>
+        </pc:spChg>
+        <pc:spChg chg="add mod">
+          <ac:chgData name="Aiden Jepson" userId="27ac3319768fac1a" providerId="LiveId" clId="{9344AE72-F363-428B-B7F1-1C064A3A24DF}" dt="2021-12-23T19:43:22.766" v="377" actId="688"/>
+          <ac:spMkLst>
+            <pc:docMk/>
+            <pc:sldMk cId="180280424" sldId="326"/>
+            <ac:spMk id="186" creationId="{2E5CAC0B-30C2-4695-8068-BF77A841145E}"/>
+          </ac:spMkLst>
+        </pc:spChg>
         <pc:picChg chg="add mod">
           <ac:chgData name="Aiden Jepson" userId="27ac3319768fac1a" providerId="LiveId" clId="{9344AE72-F363-428B-B7F1-1C064A3A24DF}" dt="2021-11-30T22:18:15.168" v="7" actId="1076"/>
           <ac:picMkLst>
             <pc:docMk/>
             <pc:sldMk cId="180280424" sldId="326"/>
             <ac:picMk id="9" creationId="{D40F93B3-220F-483A-A139-7736AF69F455}"/>
+          </ac:picMkLst>
+        </pc:picChg>
+        <pc:picChg chg="add mod">
+          <ac:chgData name="Aiden Jepson" userId="27ac3319768fac1a" providerId="LiveId" clId="{9344AE72-F363-428B-B7F1-1C064A3A24DF}" dt="2021-12-23T19:36:36.412" v="297" actId="1076"/>
+          <ac:picMkLst>
+            <pc:docMk/>
+            <pc:sldMk cId="180280424" sldId="326"/>
+            <ac:picMk id="11" creationId="{EEFC507E-9310-4667-8A0C-BCFF8F15A868}"/>
           </ac:picMkLst>
         </pc:picChg>
         <pc:picChg chg="add del mod">
@@ -2292,7 +2412,7 @@
           </a:ln>
           <a:extLst>
             <a:ext uri="{C572A759-6A51-4108-AA02-DFA0A04FC94B}">
-              <ma14:wrappingTextBoxFlag xmlns:ma14="http://schemas.microsoft.com/office/mac/drawingml/2011/main" xmlns:a14="http://schemas.microsoft.com/office/drawing/2010/main" xmlns:m="http://schemas.openxmlformats.org/officeDocument/2006/math" xmlns="" val="1"/>
+              <ma14:wrappingTextBoxFlag xmlns="" xmlns:m="http://schemas.openxmlformats.org/officeDocument/2006/math" xmlns:a14="http://schemas.microsoft.com/office/drawing/2010/main" xmlns:ma14="http://schemas.microsoft.com/office/mac/drawingml/2011/main" val="1"/>
             </a:ext>
           </a:extLst>
         </p:spPr>
@@ -2331,7 +2451,7 @@
           </a:ln>
           <a:extLst>
             <a:ext uri="{C572A759-6A51-4108-AA02-DFA0A04FC94B}">
-              <ma14:wrappingTextBoxFlag xmlns:ma14="http://schemas.microsoft.com/office/mac/drawingml/2011/main" xmlns:a14="http://schemas.microsoft.com/office/drawing/2010/main" xmlns:m="http://schemas.openxmlformats.org/officeDocument/2006/math" xmlns="" val="1"/>
+              <ma14:wrappingTextBoxFlag xmlns="" xmlns:m="http://schemas.openxmlformats.org/officeDocument/2006/math" xmlns:a14="http://schemas.microsoft.com/office/drawing/2010/main" xmlns:ma14="http://schemas.microsoft.com/office/mac/drawingml/2011/main" val="1"/>
             </a:ext>
           </a:extLst>
         </p:spPr>
@@ -3956,7 +4076,7 @@
           <a:effectLst/>
           <a:extLst>
             <a:ext uri="{C572A759-6A51-4108-AA02-DFA0A04FC94B}">
-              <ma14:wrappingTextBoxFlag xmlns:ma14="http://schemas.microsoft.com/office/mac/drawingml/2011/main" xmlns:a14="http://schemas.microsoft.com/office/drawing/2010/main" xmlns:m="http://schemas.openxmlformats.org/officeDocument/2006/math" xmlns="" val="1"/>
+              <ma14:wrappingTextBoxFlag xmlns="" xmlns:m="http://schemas.openxmlformats.org/officeDocument/2006/math" xmlns:a14="http://schemas.microsoft.com/office/drawing/2010/main" xmlns:ma14="http://schemas.microsoft.com/office/mac/drawingml/2011/main" val="1"/>
             </a:ext>
           </a:extLst>
         </p:spPr>
@@ -4259,7 +4379,7 @@
           <a:effectLst/>
           <a:extLst>
             <a:ext uri="{C572A759-6A51-4108-AA02-DFA0A04FC94B}">
-              <ma14:wrappingTextBoxFlag xmlns:ma14="http://schemas.microsoft.com/office/mac/drawingml/2011/main" xmlns:a14="http://schemas.microsoft.com/office/drawing/2010/main" xmlns:m="http://schemas.openxmlformats.org/officeDocument/2006/math" xmlns="" val="1"/>
+              <ma14:wrappingTextBoxFlag xmlns="" xmlns:m="http://schemas.openxmlformats.org/officeDocument/2006/math" xmlns:a14="http://schemas.microsoft.com/office/drawing/2010/main" xmlns:ma14="http://schemas.microsoft.com/office/mac/drawingml/2011/main" val="1"/>
             </a:ext>
           </a:extLst>
         </p:spPr>
@@ -4706,7 +4826,7 @@
           <a:effectLst/>
           <a:extLst>
             <a:ext uri="{C572A759-6A51-4108-AA02-DFA0A04FC94B}">
-              <ma14:wrappingTextBoxFlag xmlns:ma14="http://schemas.microsoft.com/office/mac/drawingml/2011/main" xmlns:a14="http://schemas.microsoft.com/office/drawing/2010/main" xmlns:m="http://schemas.openxmlformats.org/officeDocument/2006/math" xmlns="" val="1"/>
+              <ma14:wrappingTextBoxFlag xmlns="" xmlns:m="http://schemas.openxmlformats.org/officeDocument/2006/math" xmlns:a14="http://schemas.microsoft.com/office/drawing/2010/main" xmlns:ma14="http://schemas.microsoft.com/office/mac/drawingml/2011/main" val="1"/>
             </a:ext>
           </a:extLst>
         </p:spPr>
@@ -5010,7 +5130,7 @@
           <a:effectLst/>
           <a:extLst>
             <a:ext uri="{C572A759-6A51-4108-AA02-DFA0A04FC94B}">
-              <ma14:wrappingTextBoxFlag xmlns:ma14="http://schemas.microsoft.com/office/mac/drawingml/2011/main" xmlns:a14="http://schemas.microsoft.com/office/drawing/2010/main" xmlns:m="http://schemas.openxmlformats.org/officeDocument/2006/math" xmlns="" val="1"/>
+              <ma14:wrappingTextBoxFlag xmlns="" xmlns:m="http://schemas.openxmlformats.org/officeDocument/2006/math" xmlns:a14="http://schemas.microsoft.com/office/drawing/2010/main" xmlns:ma14="http://schemas.microsoft.com/office/mac/drawingml/2011/main" val="1"/>
             </a:ext>
           </a:extLst>
         </p:spPr>
@@ -5310,7 +5430,7 @@
           <a:effectLst/>
           <a:extLst>
             <a:ext uri="{C572A759-6A51-4108-AA02-DFA0A04FC94B}">
-              <ma14:wrappingTextBoxFlag xmlns:ma14="http://schemas.microsoft.com/office/mac/drawingml/2011/main" xmlns:a14="http://schemas.microsoft.com/office/drawing/2010/main" xmlns:m="http://schemas.openxmlformats.org/officeDocument/2006/math" xmlns="" val="1"/>
+              <ma14:wrappingTextBoxFlag xmlns="" xmlns:m="http://schemas.openxmlformats.org/officeDocument/2006/math" xmlns:a14="http://schemas.microsoft.com/office/drawing/2010/main" xmlns:ma14="http://schemas.microsoft.com/office/mac/drawingml/2011/main" val="1"/>
             </a:ext>
           </a:extLst>
         </p:spPr>
@@ -5614,7 +5734,7 @@
           <a:effectLst/>
           <a:extLst>
             <a:ext uri="{C572A759-6A51-4108-AA02-DFA0A04FC94B}">
-              <ma14:wrappingTextBoxFlag xmlns:ma14="http://schemas.microsoft.com/office/mac/drawingml/2011/main" xmlns:a14="http://schemas.microsoft.com/office/drawing/2010/main" xmlns:m="http://schemas.openxmlformats.org/officeDocument/2006/math" xmlns="" val="1"/>
+              <ma14:wrappingTextBoxFlag xmlns="" xmlns:m="http://schemas.openxmlformats.org/officeDocument/2006/math" xmlns:a14="http://schemas.microsoft.com/office/drawing/2010/main" xmlns:ma14="http://schemas.microsoft.com/office/mac/drawingml/2011/main" val="1"/>
             </a:ext>
           </a:extLst>
         </p:spPr>
@@ -6215,7 +6335,7 @@
           <a:effectLst/>
           <a:extLst>
             <a:ext uri="{C572A759-6A51-4108-AA02-DFA0A04FC94B}">
-              <ma14:wrappingTextBoxFlag xmlns:ma14="http://schemas.microsoft.com/office/mac/drawingml/2011/main" xmlns:a14="http://schemas.microsoft.com/office/drawing/2010/main" xmlns:m="http://schemas.openxmlformats.org/officeDocument/2006/math" xmlns="" val="1"/>
+              <ma14:wrappingTextBoxFlag xmlns="" xmlns:m="http://schemas.openxmlformats.org/officeDocument/2006/math" xmlns:a14="http://schemas.microsoft.com/office/drawing/2010/main" xmlns:ma14="http://schemas.microsoft.com/office/mac/drawingml/2011/main" val="1"/>
             </a:ext>
           </a:extLst>
         </p:spPr>
@@ -6340,7 +6460,7 @@
           </a:ln>
           <a:extLst>
             <a:ext uri="{C572A759-6A51-4108-AA02-DFA0A04FC94B}">
-              <ma14:wrappingTextBoxFlag xmlns:ma14="http://schemas.microsoft.com/office/mac/drawingml/2011/main" xmlns:a14="http://schemas.microsoft.com/office/drawing/2010/main" xmlns:m="http://schemas.openxmlformats.org/officeDocument/2006/math" xmlns="" val="1"/>
+              <ma14:wrappingTextBoxFlag xmlns="" xmlns:m="http://schemas.openxmlformats.org/officeDocument/2006/math" xmlns:a14="http://schemas.microsoft.com/office/drawing/2010/main" xmlns:ma14="http://schemas.microsoft.com/office/mac/drawingml/2011/main" val="1"/>
             </a:ext>
           </a:extLst>
         </p:spPr>
@@ -6579,7 +6699,7 @@
           <a:effectLst/>
           <a:extLst>
             <a:ext uri="{C572A759-6A51-4108-AA02-DFA0A04FC94B}">
-              <ma14:wrappingTextBoxFlag xmlns:ma14="http://schemas.microsoft.com/office/mac/drawingml/2011/main" xmlns:a14="http://schemas.microsoft.com/office/drawing/2010/main" xmlns:m="http://schemas.openxmlformats.org/officeDocument/2006/math" xmlns="" val="1"/>
+              <ma14:wrappingTextBoxFlag xmlns="" xmlns:m="http://schemas.openxmlformats.org/officeDocument/2006/math" xmlns:a14="http://schemas.microsoft.com/office/drawing/2010/main" xmlns:ma14="http://schemas.microsoft.com/office/mac/drawingml/2011/main" val="1"/>
             </a:ext>
           </a:extLst>
         </p:spPr>
@@ -6703,7 +6823,7 @@
           </a:ln>
           <a:extLst>
             <a:ext uri="{C572A759-6A51-4108-AA02-DFA0A04FC94B}">
-              <ma14:wrappingTextBoxFlag xmlns:ma14="http://schemas.microsoft.com/office/mac/drawingml/2011/main" xmlns:a14="http://schemas.microsoft.com/office/drawing/2010/main" xmlns:m="http://schemas.openxmlformats.org/officeDocument/2006/math" xmlns="" val="1"/>
+              <ma14:wrappingTextBoxFlag xmlns="" xmlns:m="http://schemas.openxmlformats.org/officeDocument/2006/math" xmlns:a14="http://schemas.microsoft.com/office/drawing/2010/main" xmlns:ma14="http://schemas.microsoft.com/office/mac/drawingml/2011/main" val="1"/>
             </a:ext>
           </a:extLst>
         </p:spPr>
@@ -6946,7 +7066,7 @@
           <a:effectLst/>
           <a:extLst>
             <a:ext uri="{C572A759-6A51-4108-AA02-DFA0A04FC94B}">
-              <ma14:wrappingTextBoxFlag xmlns:ma14="http://schemas.microsoft.com/office/mac/drawingml/2011/main" xmlns:a14="http://schemas.microsoft.com/office/drawing/2010/main" xmlns:m="http://schemas.openxmlformats.org/officeDocument/2006/math" xmlns="" val="1"/>
+              <ma14:wrappingTextBoxFlag xmlns="" xmlns:m="http://schemas.openxmlformats.org/officeDocument/2006/math" xmlns:a14="http://schemas.microsoft.com/office/drawing/2010/main" xmlns:ma14="http://schemas.microsoft.com/office/mac/drawingml/2011/main" val="1"/>
             </a:ext>
           </a:extLst>
         </p:spPr>
@@ -7074,7 +7194,7 @@
           </a:ln>
           <a:extLst>
             <a:ext uri="{C572A759-6A51-4108-AA02-DFA0A04FC94B}">
-              <ma14:wrappingTextBoxFlag xmlns:ma14="http://schemas.microsoft.com/office/mac/drawingml/2011/main" xmlns:a14="http://schemas.microsoft.com/office/drawing/2010/main" xmlns:m="http://schemas.openxmlformats.org/officeDocument/2006/math" xmlns="" val="1"/>
+              <ma14:wrappingTextBoxFlag xmlns="" xmlns:m="http://schemas.openxmlformats.org/officeDocument/2006/math" xmlns:a14="http://schemas.microsoft.com/office/drawing/2010/main" xmlns:ma14="http://schemas.microsoft.com/office/mac/drawingml/2011/main" val="1"/>
             </a:ext>
           </a:extLst>
         </p:spPr>
@@ -7317,7 +7437,7 @@
           <a:effectLst/>
           <a:extLst>
             <a:ext uri="{C572A759-6A51-4108-AA02-DFA0A04FC94B}">
-              <ma14:wrappingTextBoxFlag xmlns:ma14="http://schemas.microsoft.com/office/mac/drawingml/2011/main" xmlns:a14="http://schemas.microsoft.com/office/drawing/2010/main" xmlns:m="http://schemas.openxmlformats.org/officeDocument/2006/math" xmlns="" val="1"/>
+              <ma14:wrappingTextBoxFlag xmlns="" xmlns:m="http://schemas.openxmlformats.org/officeDocument/2006/math" xmlns:a14="http://schemas.microsoft.com/office/drawing/2010/main" xmlns:ma14="http://schemas.microsoft.com/office/mac/drawingml/2011/main" val="1"/>
             </a:ext>
           </a:extLst>
         </p:spPr>
@@ -7646,7 +7766,7 @@
           <a:effectLst/>
           <a:extLst>
             <a:ext uri="{C572A759-6A51-4108-AA02-DFA0A04FC94B}">
-              <ma14:wrappingTextBoxFlag xmlns:ma14="http://schemas.microsoft.com/office/mac/drawingml/2011/main" xmlns:a14="http://schemas.microsoft.com/office/drawing/2010/main" xmlns:m="http://schemas.openxmlformats.org/officeDocument/2006/math" xmlns="" val="1"/>
+              <ma14:wrappingTextBoxFlag xmlns="" xmlns:m="http://schemas.openxmlformats.org/officeDocument/2006/math" xmlns:a14="http://schemas.microsoft.com/office/drawing/2010/main" xmlns:ma14="http://schemas.microsoft.com/office/mac/drawingml/2011/main" val="1"/>
             </a:ext>
           </a:extLst>
         </p:spPr>
@@ -7975,7 +8095,7 @@
           <a:effectLst/>
           <a:extLst>
             <a:ext uri="{C572A759-6A51-4108-AA02-DFA0A04FC94B}">
-              <ma14:wrappingTextBoxFlag xmlns:ma14="http://schemas.microsoft.com/office/mac/drawingml/2011/main" xmlns:a14="http://schemas.microsoft.com/office/drawing/2010/main" xmlns:m="http://schemas.openxmlformats.org/officeDocument/2006/math" xmlns="" val="1"/>
+              <ma14:wrappingTextBoxFlag xmlns="" xmlns:m="http://schemas.openxmlformats.org/officeDocument/2006/math" xmlns:a14="http://schemas.microsoft.com/office/drawing/2010/main" xmlns:ma14="http://schemas.microsoft.com/office/mac/drawingml/2011/main" val="1"/>
             </a:ext>
           </a:extLst>
         </p:spPr>
@@ -8098,7 +8218,7 @@
           </a:ln>
           <a:extLst>
             <a:ext uri="{C572A759-6A51-4108-AA02-DFA0A04FC94B}">
-              <ma14:wrappingTextBoxFlag xmlns:ma14="http://schemas.microsoft.com/office/mac/drawingml/2011/main" xmlns:a14="http://schemas.microsoft.com/office/drawing/2010/main" xmlns:m="http://schemas.openxmlformats.org/officeDocument/2006/math" xmlns="" val="1"/>
+              <ma14:wrappingTextBoxFlag xmlns="" xmlns:m="http://schemas.openxmlformats.org/officeDocument/2006/math" xmlns:a14="http://schemas.microsoft.com/office/drawing/2010/main" xmlns:ma14="http://schemas.microsoft.com/office/mac/drawingml/2011/main" val="1"/>
             </a:ext>
           </a:extLst>
         </p:spPr>
@@ -8341,7 +8461,7 @@
           <a:effectLst/>
           <a:extLst>
             <a:ext uri="{C572A759-6A51-4108-AA02-DFA0A04FC94B}">
-              <ma14:wrappingTextBoxFlag xmlns:ma14="http://schemas.microsoft.com/office/mac/drawingml/2011/main" xmlns:a14="http://schemas.microsoft.com/office/drawing/2010/main" xmlns:m="http://schemas.openxmlformats.org/officeDocument/2006/math" xmlns="" val="1"/>
+              <ma14:wrappingTextBoxFlag xmlns="" xmlns:m="http://schemas.openxmlformats.org/officeDocument/2006/math" xmlns:a14="http://schemas.microsoft.com/office/drawing/2010/main" xmlns:ma14="http://schemas.microsoft.com/office/mac/drawingml/2011/main" val="1"/>
             </a:ext>
           </a:extLst>
         </p:spPr>
@@ -8466,7 +8586,7 @@
           </a:ln>
           <a:extLst>
             <a:ext uri="{C572A759-6A51-4108-AA02-DFA0A04FC94B}">
-              <ma14:wrappingTextBoxFlag xmlns:ma14="http://schemas.microsoft.com/office/mac/drawingml/2011/main" xmlns:a14="http://schemas.microsoft.com/office/drawing/2010/main" xmlns:m="http://schemas.openxmlformats.org/officeDocument/2006/math" xmlns="" val="1"/>
+              <ma14:wrappingTextBoxFlag xmlns="" xmlns:m="http://schemas.openxmlformats.org/officeDocument/2006/math" xmlns:a14="http://schemas.microsoft.com/office/drawing/2010/main" xmlns:ma14="http://schemas.microsoft.com/office/mac/drawingml/2011/main" val="1"/>
             </a:ext>
           </a:extLst>
         </p:spPr>
@@ -8879,7 +8999,7 @@
             <a:effectLst/>
             <a:extLst>
               <a:ext uri="{C572A759-6A51-4108-AA02-DFA0A04FC94B}">
-                <ma14:wrappingTextBoxFlag xmlns:ma14="http://schemas.microsoft.com/office/mac/drawingml/2011/main" xmlns:a14="http://schemas.microsoft.com/office/drawing/2010/main" xmlns:m="http://schemas.openxmlformats.org/officeDocument/2006/math" xmlns="" val="1"/>
+                <ma14:wrappingTextBoxFlag xmlns="" xmlns:m="http://schemas.openxmlformats.org/officeDocument/2006/math" xmlns:a14="http://schemas.microsoft.com/office/drawing/2010/main" xmlns:ma14="http://schemas.microsoft.com/office/mac/drawingml/2011/main" val="1"/>
               </a:ext>
             </a:extLst>
           </p:spPr>
@@ -9006,7 +9126,7 @@
             <a:effectLst/>
             <a:extLst>
               <a:ext uri="{C572A759-6A51-4108-AA02-DFA0A04FC94B}">
-                <ma14:wrappingTextBoxFlag xmlns:ma14="http://schemas.microsoft.com/office/mac/drawingml/2011/main" xmlns:a14="http://schemas.microsoft.com/office/drawing/2010/main" xmlns:m="http://schemas.openxmlformats.org/officeDocument/2006/math" xmlns="" val="1"/>
+                <ma14:wrappingTextBoxFlag xmlns="" xmlns:m="http://schemas.openxmlformats.org/officeDocument/2006/math" xmlns:a14="http://schemas.microsoft.com/office/drawing/2010/main" xmlns:ma14="http://schemas.microsoft.com/office/mac/drawingml/2011/main" val="1"/>
               </a:ext>
             </a:extLst>
           </p:spPr>
@@ -9268,7 +9388,7 @@
             <a:effectLst/>
             <a:extLst>
               <a:ext uri="{C572A759-6A51-4108-AA02-DFA0A04FC94B}">
-                <ma14:wrappingTextBoxFlag xmlns:ma14="http://schemas.microsoft.com/office/mac/drawingml/2011/main" xmlns:a14="http://schemas.microsoft.com/office/drawing/2010/main" xmlns:m="http://schemas.openxmlformats.org/officeDocument/2006/math" xmlns="" val="1"/>
+                <ma14:wrappingTextBoxFlag xmlns="" xmlns:m="http://schemas.openxmlformats.org/officeDocument/2006/math" xmlns:a14="http://schemas.microsoft.com/office/drawing/2010/main" xmlns:ma14="http://schemas.microsoft.com/office/mac/drawingml/2011/main" val="1"/>
               </a:ext>
             </a:extLst>
           </p:spPr>
@@ -9393,7 +9513,7 @@
             </a:ln>
             <a:extLst>
               <a:ext uri="{C572A759-6A51-4108-AA02-DFA0A04FC94B}">
-                <ma14:wrappingTextBoxFlag xmlns:ma14="http://schemas.microsoft.com/office/mac/drawingml/2011/main" xmlns:a14="http://schemas.microsoft.com/office/drawing/2010/main" xmlns:m="http://schemas.openxmlformats.org/officeDocument/2006/math" xmlns="" val="1"/>
+                <ma14:wrappingTextBoxFlag xmlns="" xmlns:m="http://schemas.openxmlformats.org/officeDocument/2006/math" xmlns:a14="http://schemas.microsoft.com/office/drawing/2010/main" xmlns:ma14="http://schemas.microsoft.com/office/mac/drawingml/2011/main" val="1"/>
               </a:ext>
             </a:extLst>
           </p:spPr>
@@ -9655,7 +9775,7 @@
             <a:effectLst/>
             <a:extLst>
               <a:ext uri="{C572A759-6A51-4108-AA02-DFA0A04FC94B}">
-                <ma14:wrappingTextBoxFlag xmlns:ma14="http://schemas.microsoft.com/office/mac/drawingml/2011/main" xmlns:a14="http://schemas.microsoft.com/office/drawing/2010/main" xmlns:m="http://schemas.openxmlformats.org/officeDocument/2006/math" xmlns="" val="1"/>
+                <ma14:wrappingTextBoxFlag xmlns="" xmlns:m="http://schemas.openxmlformats.org/officeDocument/2006/math" xmlns:a14="http://schemas.microsoft.com/office/drawing/2010/main" xmlns:ma14="http://schemas.microsoft.com/office/mac/drawingml/2011/main" val="1"/>
               </a:ext>
             </a:extLst>
           </p:spPr>
@@ -9780,7 +9900,7 @@
             </a:ln>
             <a:extLst>
               <a:ext uri="{C572A759-6A51-4108-AA02-DFA0A04FC94B}">
-                <ma14:wrappingTextBoxFlag xmlns:ma14="http://schemas.microsoft.com/office/mac/drawingml/2011/main" xmlns:a14="http://schemas.microsoft.com/office/drawing/2010/main" xmlns:m="http://schemas.openxmlformats.org/officeDocument/2006/math" xmlns="" val="1"/>
+                <ma14:wrappingTextBoxFlag xmlns="" xmlns:m="http://schemas.openxmlformats.org/officeDocument/2006/math" xmlns:a14="http://schemas.microsoft.com/office/drawing/2010/main" xmlns:ma14="http://schemas.microsoft.com/office/mac/drawingml/2011/main" val="1"/>
               </a:ext>
             </a:extLst>
           </p:spPr>
@@ -10042,7 +10162,7 @@
             <a:effectLst/>
             <a:extLst>
               <a:ext uri="{C572A759-6A51-4108-AA02-DFA0A04FC94B}">
-                <ma14:wrappingTextBoxFlag xmlns:ma14="http://schemas.microsoft.com/office/mac/drawingml/2011/main" xmlns:a14="http://schemas.microsoft.com/office/drawing/2010/main" xmlns:m="http://schemas.openxmlformats.org/officeDocument/2006/math" xmlns="" val="1"/>
+                <ma14:wrappingTextBoxFlag xmlns="" xmlns:m="http://schemas.openxmlformats.org/officeDocument/2006/math" xmlns:a14="http://schemas.microsoft.com/office/drawing/2010/main" xmlns:ma14="http://schemas.microsoft.com/office/mac/drawingml/2011/main" val="1"/>
               </a:ext>
             </a:extLst>
           </p:spPr>
@@ -10167,7 +10287,7 @@
             </a:ln>
             <a:extLst>
               <a:ext uri="{C572A759-6A51-4108-AA02-DFA0A04FC94B}">
-                <ma14:wrappingTextBoxFlag xmlns:ma14="http://schemas.microsoft.com/office/mac/drawingml/2011/main" xmlns:a14="http://schemas.microsoft.com/office/drawing/2010/main" xmlns:m="http://schemas.openxmlformats.org/officeDocument/2006/math" xmlns="" val="1"/>
+                <ma14:wrappingTextBoxFlag xmlns="" xmlns:m="http://schemas.openxmlformats.org/officeDocument/2006/math" xmlns:a14="http://schemas.microsoft.com/office/drawing/2010/main" xmlns:ma14="http://schemas.microsoft.com/office/mac/drawingml/2011/main" val="1"/>
               </a:ext>
             </a:extLst>
           </p:spPr>
@@ -10411,7 +10531,7 @@
           <a:effectLst/>
           <a:extLst>
             <a:ext uri="{C572A759-6A51-4108-AA02-DFA0A04FC94B}">
-              <ma14:wrappingTextBoxFlag xmlns:ma14="http://schemas.microsoft.com/office/mac/drawingml/2011/main" xmlns:a14="http://schemas.microsoft.com/office/drawing/2010/main" xmlns:m="http://schemas.openxmlformats.org/officeDocument/2006/math" xmlns="" val="1"/>
+              <ma14:wrappingTextBoxFlag xmlns="" xmlns:m="http://schemas.openxmlformats.org/officeDocument/2006/math" xmlns:a14="http://schemas.microsoft.com/office/drawing/2010/main" xmlns:ma14="http://schemas.microsoft.com/office/mac/drawingml/2011/main" val="1"/>
             </a:ext>
           </a:extLst>
         </p:spPr>
@@ -10528,7 +10648,7 @@
           </a:ln>
           <a:extLst>
             <a:ext uri="{C572A759-6A51-4108-AA02-DFA0A04FC94B}">
-              <ma14:wrappingTextBoxFlag xmlns:ma14="http://schemas.microsoft.com/office/mac/drawingml/2011/main" xmlns:a14="http://schemas.microsoft.com/office/drawing/2010/main" xmlns:m="http://schemas.openxmlformats.org/officeDocument/2006/math" xmlns="" val="1"/>
+              <ma14:wrappingTextBoxFlag xmlns="" xmlns:m="http://schemas.openxmlformats.org/officeDocument/2006/math" xmlns:a14="http://schemas.microsoft.com/office/drawing/2010/main" xmlns:ma14="http://schemas.microsoft.com/office/mac/drawingml/2011/main" val="1"/>
             </a:ext>
           </a:extLst>
         </p:spPr>
@@ -10724,7 +10844,7 @@
           </a:ln>
           <a:extLst>
             <a:ext uri="{C572A759-6A51-4108-AA02-DFA0A04FC94B}">
-              <ma14:wrappingTextBoxFlag xmlns:ma14="http://schemas.microsoft.com/office/mac/drawingml/2011/main" xmlns:a14="http://schemas.microsoft.com/office/drawing/2010/main" xmlns:m="http://schemas.openxmlformats.org/officeDocument/2006/math" xmlns="" val="1"/>
+              <ma14:wrappingTextBoxFlag xmlns="" xmlns:m="http://schemas.openxmlformats.org/officeDocument/2006/math" xmlns:a14="http://schemas.microsoft.com/office/drawing/2010/main" xmlns:ma14="http://schemas.microsoft.com/office/mac/drawingml/2011/main" val="1"/>
             </a:ext>
           </a:extLst>
         </p:spPr>
@@ -11007,7 +11127,7 @@
           <a:effectLst/>
           <a:extLst>
             <a:ext uri="{C572A759-6A51-4108-AA02-DFA0A04FC94B}">
-              <ma14:wrappingTextBoxFlag xmlns:ma14="http://schemas.microsoft.com/office/mac/drawingml/2011/main" xmlns:a14="http://schemas.microsoft.com/office/drawing/2010/main" xmlns:m="http://schemas.openxmlformats.org/officeDocument/2006/math" xmlns="" val="1"/>
+              <ma14:wrappingTextBoxFlag xmlns="" xmlns:m="http://schemas.openxmlformats.org/officeDocument/2006/math" xmlns:a14="http://schemas.microsoft.com/office/drawing/2010/main" xmlns:ma14="http://schemas.microsoft.com/office/mac/drawingml/2011/main" val="1"/>
             </a:ext>
           </a:extLst>
         </p:spPr>
@@ -11132,7 +11252,7 @@
           </a:ln>
           <a:extLst>
             <a:ext uri="{C572A759-6A51-4108-AA02-DFA0A04FC94B}">
-              <ma14:wrappingTextBoxFlag xmlns:ma14="http://schemas.microsoft.com/office/mac/drawingml/2011/main" xmlns:a14="http://schemas.microsoft.com/office/drawing/2010/main" xmlns:m="http://schemas.openxmlformats.org/officeDocument/2006/math" xmlns="" val="1"/>
+              <ma14:wrappingTextBoxFlag xmlns="" xmlns:m="http://schemas.openxmlformats.org/officeDocument/2006/math" xmlns:a14="http://schemas.microsoft.com/office/drawing/2010/main" xmlns:ma14="http://schemas.microsoft.com/office/mac/drawingml/2011/main" val="1"/>
             </a:ext>
           </a:extLst>
         </p:spPr>
@@ -11375,7 +11495,7 @@
           <a:effectLst/>
           <a:extLst>
             <a:ext uri="{C572A759-6A51-4108-AA02-DFA0A04FC94B}">
-              <ma14:wrappingTextBoxFlag xmlns:ma14="http://schemas.microsoft.com/office/mac/drawingml/2011/main" xmlns:a14="http://schemas.microsoft.com/office/drawing/2010/main" xmlns:m="http://schemas.openxmlformats.org/officeDocument/2006/math" xmlns="" val="1"/>
+              <ma14:wrappingTextBoxFlag xmlns="" xmlns:m="http://schemas.openxmlformats.org/officeDocument/2006/math" xmlns:a14="http://schemas.microsoft.com/office/drawing/2010/main" xmlns:ma14="http://schemas.microsoft.com/office/mac/drawingml/2011/main" val="1"/>
             </a:ext>
           </a:extLst>
         </p:spPr>
@@ -11498,7 +11618,7 @@
           </a:ln>
           <a:extLst>
             <a:ext uri="{C572A759-6A51-4108-AA02-DFA0A04FC94B}">
-              <ma14:wrappingTextBoxFlag xmlns:ma14="http://schemas.microsoft.com/office/mac/drawingml/2011/main" xmlns:a14="http://schemas.microsoft.com/office/drawing/2010/main" xmlns:m="http://schemas.openxmlformats.org/officeDocument/2006/math" xmlns="" val="1"/>
+              <ma14:wrappingTextBoxFlag xmlns="" xmlns:m="http://schemas.openxmlformats.org/officeDocument/2006/math" xmlns:a14="http://schemas.microsoft.com/office/drawing/2010/main" xmlns:ma14="http://schemas.microsoft.com/office/mac/drawingml/2011/main" val="1"/>
             </a:ext>
           </a:extLst>
         </p:spPr>
@@ -11841,7 +11961,7 @@
           <a:effectLst/>
           <a:extLst>
             <a:ext uri="{C572A759-6A51-4108-AA02-DFA0A04FC94B}">
-              <ma14:wrappingTextBoxFlag xmlns:ma14="http://schemas.microsoft.com/office/mac/drawingml/2011/main" xmlns:a14="http://schemas.microsoft.com/office/drawing/2010/main" xmlns:m="http://schemas.openxmlformats.org/officeDocument/2006/math" xmlns="" val="1"/>
+              <ma14:wrappingTextBoxFlag xmlns="" xmlns:m="http://schemas.openxmlformats.org/officeDocument/2006/math" xmlns:a14="http://schemas.microsoft.com/office/drawing/2010/main" xmlns:ma14="http://schemas.microsoft.com/office/mac/drawingml/2011/main" val="1"/>
             </a:ext>
           </a:extLst>
         </p:spPr>
@@ -12162,7 +12282,7 @@
           <a:effectLst/>
           <a:extLst>
             <a:ext uri="{C572A759-6A51-4108-AA02-DFA0A04FC94B}">
-              <ma14:wrappingTextBoxFlag xmlns:ma14="http://schemas.microsoft.com/office/mac/drawingml/2011/main" xmlns:a14="http://schemas.microsoft.com/office/drawing/2010/main" xmlns:m="http://schemas.openxmlformats.org/officeDocument/2006/math" xmlns="" val="1"/>
+              <ma14:wrappingTextBoxFlag xmlns="" xmlns:m="http://schemas.openxmlformats.org/officeDocument/2006/math" xmlns:a14="http://schemas.microsoft.com/office/drawing/2010/main" xmlns:ma14="http://schemas.microsoft.com/office/mac/drawingml/2011/main" val="1"/>
             </a:ext>
           </a:extLst>
         </p:spPr>
@@ -12296,7 +12416,7 @@
           </a:ln>
           <a:extLst>
             <a:ext uri="{C572A759-6A51-4108-AA02-DFA0A04FC94B}">
-              <ma14:wrappingTextBoxFlag xmlns:ma14="http://schemas.microsoft.com/office/mac/drawingml/2011/main" xmlns:a14="http://schemas.microsoft.com/office/drawing/2010/main" xmlns:m="http://schemas.openxmlformats.org/officeDocument/2006/math" xmlns="" val="1"/>
+              <ma14:wrappingTextBoxFlag xmlns="" xmlns:m="http://schemas.openxmlformats.org/officeDocument/2006/math" xmlns:a14="http://schemas.microsoft.com/office/drawing/2010/main" xmlns:ma14="http://schemas.microsoft.com/office/mac/drawingml/2011/main" val="1"/>
             </a:ext>
           </a:extLst>
         </p:spPr>
@@ -12539,7 +12659,7 @@
           <a:effectLst/>
           <a:extLst>
             <a:ext uri="{C572A759-6A51-4108-AA02-DFA0A04FC94B}">
-              <ma14:wrappingTextBoxFlag xmlns:ma14="http://schemas.microsoft.com/office/mac/drawingml/2011/main" xmlns:a14="http://schemas.microsoft.com/office/drawing/2010/main" xmlns:m="http://schemas.openxmlformats.org/officeDocument/2006/math" xmlns="" val="1"/>
+              <ma14:wrappingTextBoxFlag xmlns="" xmlns:m="http://schemas.openxmlformats.org/officeDocument/2006/math" xmlns:a14="http://schemas.microsoft.com/office/drawing/2010/main" xmlns:ma14="http://schemas.microsoft.com/office/mac/drawingml/2011/main" val="1"/>
             </a:ext>
           </a:extLst>
         </p:spPr>
@@ -12662,7 +12782,7 @@
           </a:ln>
           <a:extLst>
             <a:ext uri="{C572A759-6A51-4108-AA02-DFA0A04FC94B}">
-              <ma14:wrappingTextBoxFlag xmlns:ma14="http://schemas.microsoft.com/office/mac/drawingml/2011/main" xmlns:a14="http://schemas.microsoft.com/office/drawing/2010/main" xmlns:m="http://schemas.openxmlformats.org/officeDocument/2006/math" xmlns="" val="1"/>
+              <ma14:wrappingTextBoxFlag xmlns="" xmlns:m="http://schemas.openxmlformats.org/officeDocument/2006/math" xmlns:a14="http://schemas.microsoft.com/office/drawing/2010/main" xmlns:ma14="http://schemas.microsoft.com/office/mac/drawingml/2011/main" val="1"/>
             </a:ext>
           </a:extLst>
         </p:spPr>
@@ -12888,7 +13008,7 @@
           </a:ln>
           <a:extLst>
             <a:ext uri="{C572A759-6A51-4108-AA02-DFA0A04FC94B}">
-              <ma14:wrappingTextBoxFlag xmlns:ma14="http://schemas.microsoft.com/office/mac/drawingml/2011/main" xmlns:a14="http://schemas.microsoft.com/office/drawing/2010/main" xmlns:m="http://schemas.openxmlformats.org/officeDocument/2006/math" xmlns="" val="1"/>
+              <ma14:wrappingTextBoxFlag xmlns="" xmlns:m="http://schemas.openxmlformats.org/officeDocument/2006/math" xmlns:a14="http://schemas.microsoft.com/office/drawing/2010/main" xmlns:ma14="http://schemas.microsoft.com/office/mac/drawingml/2011/main" val="1"/>
             </a:ext>
           </a:extLst>
         </p:spPr>
@@ -12934,11 +13054,960 @@
           </a:ln>
           <a:extLst>
             <a:ext uri="{C572A759-6A51-4108-AA02-DFA0A04FC94B}">
-              <ma14:wrappingTextBoxFlag xmlns:ma14="http://schemas.microsoft.com/office/mac/drawingml/2011/main" xmlns:a14="http://schemas.microsoft.com/office/drawing/2010/main" xmlns:m="http://schemas.openxmlformats.org/officeDocument/2006/math" xmlns="" val="1"/>
+              <ma14:wrappingTextBoxFlag xmlns="" xmlns:m="http://schemas.openxmlformats.org/officeDocument/2006/math" xmlns:a14="http://schemas.microsoft.com/office/drawing/2010/main" xmlns:ma14="http://schemas.microsoft.com/office/mac/drawingml/2011/main" val="1"/>
             </a:ext>
           </a:extLst>
         </p:spPr>
       </p:pic>
+      <p:pic>
+        <p:nvPicPr>
+          <p:cNvPr id="11" name="Picture 10" descr="A picture containing blue, seat&#10;&#10;Description automatically generated">
+            <a:extLst>
+              <a:ext uri="{FF2B5EF4-FFF2-40B4-BE49-F238E27FC236}">
+                <a16:creationId xmlns:a16="http://schemas.microsoft.com/office/drawing/2014/main" id="{EEFC507E-9310-4667-8A0C-BCFF8F15A868}"/>
+              </a:ext>
+            </a:extLst>
+          </p:cNvPr>
+          <p:cNvPicPr>
+            <a:picLocks noChangeAspect="1"/>
+          </p:cNvPicPr>
+          <p:nvPr/>
+        </p:nvPicPr>
+        <p:blipFill>
+          <a:blip r:embed="rId33">
+            <a:extLst>
+              <a:ext uri="{28A0092B-C50C-407E-A947-70E740481C1C}">
+                <a14:useLocalDpi xmlns:a14="http://schemas.microsoft.com/office/drawing/2010/main" val="0"/>
+              </a:ext>
+            </a:extLst>
+          </a:blip>
+          <a:stretch>
+            <a:fillRect/>
+          </a:stretch>
+        </p:blipFill>
+        <p:spPr>
+          <a:xfrm>
+            <a:off x="5552361" y="2708276"/>
+            <a:ext cx="609600" cy="609600"/>
+          </a:xfrm>
+          <a:prstGeom prst="rect">
+            <a:avLst/>
+          </a:prstGeom>
+        </p:spPr>
+      </p:pic>
+      <p:sp>
+        <p:nvSpPr>
+          <p:cNvPr id="19" name="Heart 18">
+            <a:extLst>
+              <a:ext uri="{FF2B5EF4-FFF2-40B4-BE49-F238E27FC236}">
+                <a16:creationId xmlns:a16="http://schemas.microsoft.com/office/drawing/2014/main" id="{8BC4D36B-B8CC-4DCB-9A40-860E86361382}"/>
+              </a:ext>
+            </a:extLst>
+          </p:cNvPr>
+          <p:cNvSpPr/>
+          <p:nvPr/>
+        </p:nvSpPr>
+        <p:spPr>
+          <a:xfrm>
+            <a:off x="5334228" y="2265375"/>
+            <a:ext cx="252397" cy="252397"/>
+          </a:xfrm>
+          <a:prstGeom prst="heart">
+            <a:avLst/>
+          </a:prstGeom>
+          <a:solidFill>
+            <a:schemeClr val="accent2">
+              <a:lumMod val="75000"/>
+            </a:schemeClr>
+          </a:solidFill>
+          <a:ln w="12700" cap="flat">
+            <a:noFill/>
+            <a:miter lim="400000"/>
+          </a:ln>
+          <a:effectLst/>
+          <a:sp3d/>
+        </p:spPr>
+        <p:style>
+          <a:lnRef idx="0">
+            <a:scrgbClr r="0" g="0" b="0"/>
+          </a:lnRef>
+          <a:fillRef idx="0">
+            <a:scrgbClr r="0" g="0" b="0"/>
+          </a:fillRef>
+          <a:effectRef idx="0">
+            <a:scrgbClr r="0" g="0" b="0"/>
+          </a:effectRef>
+          <a:fontRef idx="none"/>
+        </p:style>
+        <p:txBody>
+          <a:bodyPr rot="0" spcFirstLastPara="1" vertOverflow="overflow" horzOverflow="overflow" vert="horz" wrap="square" lIns="0" tIns="0" rIns="0" bIns="0" numCol="1" spcCol="38100" rtlCol="0" anchor="ctr">
+            <a:spAutoFit/>
+          </a:bodyPr>
+          <a:lstStyle/>
+          <a:p>
+            <a:pPr marL="0" marR="0" indent="0" algn="ctr" defTabSz="825500" rtl="0" fontAlgn="auto" latinLnBrk="0" hangingPunct="0">
+              <a:lnSpc>
+                <a:spcPct val="100000"/>
+              </a:lnSpc>
+              <a:spcBef>
+                <a:spcPts val="0"/>
+              </a:spcBef>
+              <a:spcAft>
+                <a:spcPts val="0"/>
+              </a:spcAft>
+              <a:buClrTx/>
+              <a:buSzTx/>
+              <a:buFontTx/>
+              <a:buNone/>
+              <a:tabLst/>
+            </a:pPr>
+            <a:endParaRPr kumimoji="0" lang="en-US" sz="3200" b="0" i="0" u="none" strike="noStrike" cap="none" spc="0" normalizeH="0" baseline="0">
+              <a:ln>
+                <a:noFill/>
+              </a:ln>
+              <a:solidFill>
+                <a:srgbClr val="FFFFFF"/>
+              </a:solidFill>
+              <a:effectLst/>
+              <a:uFillTx/>
+              <a:latin typeface="+mn-lt"/>
+              <a:ea typeface="+mn-ea"/>
+              <a:cs typeface="+mn-cs"/>
+              <a:sym typeface="Helvetica Neue Medium"/>
+            </a:endParaRPr>
+          </a:p>
+        </p:txBody>
+      </p:sp>
+      <p:sp>
+        <p:nvSpPr>
+          <p:cNvPr id="157" name="Heart 156">
+            <a:extLst>
+              <a:ext uri="{FF2B5EF4-FFF2-40B4-BE49-F238E27FC236}">
+                <a16:creationId xmlns:a16="http://schemas.microsoft.com/office/drawing/2014/main" id="{26660013-C9FD-4331-9EDD-7D0ACEFC8DFC}"/>
+              </a:ext>
+            </a:extLst>
+          </p:cNvPr>
+          <p:cNvSpPr/>
+          <p:nvPr/>
+        </p:nvSpPr>
+        <p:spPr>
+          <a:xfrm>
+            <a:off x="5773070" y="2471995"/>
+            <a:ext cx="163768" cy="163768"/>
+          </a:xfrm>
+          <a:prstGeom prst="heart">
+            <a:avLst/>
+          </a:prstGeom>
+          <a:solidFill>
+            <a:schemeClr val="accent2">
+              <a:lumMod val="75000"/>
+            </a:schemeClr>
+          </a:solidFill>
+          <a:ln w="12700" cap="flat">
+            <a:noFill/>
+            <a:miter lim="400000"/>
+          </a:ln>
+          <a:effectLst/>
+          <a:sp3d/>
+        </p:spPr>
+        <p:style>
+          <a:lnRef idx="0">
+            <a:scrgbClr r="0" g="0" b="0"/>
+          </a:lnRef>
+          <a:fillRef idx="0">
+            <a:scrgbClr r="0" g="0" b="0"/>
+          </a:fillRef>
+          <a:effectRef idx="0">
+            <a:scrgbClr r="0" g="0" b="0"/>
+          </a:effectRef>
+          <a:fontRef idx="none"/>
+        </p:style>
+        <p:txBody>
+          <a:bodyPr rot="0" spcFirstLastPara="1" vertOverflow="overflow" horzOverflow="overflow" vert="horz" wrap="square" lIns="0" tIns="0" rIns="0" bIns="0" numCol="1" spcCol="38100" rtlCol="0" anchor="ctr">
+            <a:spAutoFit/>
+          </a:bodyPr>
+          <a:lstStyle/>
+          <a:p>
+            <a:pPr marL="0" marR="0" indent="0" algn="ctr" defTabSz="825500" rtl="0" fontAlgn="auto" latinLnBrk="0" hangingPunct="0">
+              <a:lnSpc>
+                <a:spcPct val="100000"/>
+              </a:lnSpc>
+              <a:spcBef>
+                <a:spcPts val="0"/>
+              </a:spcBef>
+              <a:spcAft>
+                <a:spcPts val="0"/>
+              </a:spcAft>
+              <a:buClrTx/>
+              <a:buSzTx/>
+              <a:buFontTx/>
+              <a:buNone/>
+              <a:tabLst/>
+            </a:pPr>
+            <a:endParaRPr kumimoji="0" lang="en-US" sz="3200" b="0" i="0" u="none" strike="noStrike" cap="none" spc="0" normalizeH="0" baseline="0">
+              <a:ln>
+                <a:noFill/>
+              </a:ln>
+              <a:solidFill>
+                <a:srgbClr val="FFFFFF"/>
+              </a:solidFill>
+              <a:effectLst/>
+              <a:uFillTx/>
+              <a:latin typeface="+mn-lt"/>
+              <a:ea typeface="+mn-ea"/>
+              <a:cs typeface="+mn-cs"/>
+              <a:sym typeface="Helvetica Neue Medium"/>
+            </a:endParaRPr>
+          </a:p>
+        </p:txBody>
+      </p:sp>
+      <p:sp>
+        <p:nvSpPr>
+          <p:cNvPr id="158" name="Heart 157">
+            <a:extLst>
+              <a:ext uri="{FF2B5EF4-FFF2-40B4-BE49-F238E27FC236}">
+                <a16:creationId xmlns:a16="http://schemas.microsoft.com/office/drawing/2014/main" id="{2CCA6BAB-F5D2-48A6-9CA8-90C264336197}"/>
+              </a:ext>
+            </a:extLst>
+          </p:cNvPr>
+          <p:cNvSpPr/>
+          <p:nvPr/>
+        </p:nvSpPr>
+        <p:spPr>
+          <a:xfrm>
+            <a:off x="4951355" y="2468853"/>
+            <a:ext cx="163768" cy="163768"/>
+          </a:xfrm>
+          <a:prstGeom prst="heart">
+            <a:avLst/>
+          </a:prstGeom>
+          <a:solidFill>
+            <a:schemeClr val="accent2">
+              <a:lumMod val="75000"/>
+            </a:schemeClr>
+          </a:solidFill>
+          <a:ln w="12700" cap="flat">
+            <a:noFill/>
+            <a:miter lim="400000"/>
+          </a:ln>
+          <a:effectLst/>
+          <a:sp3d/>
+        </p:spPr>
+        <p:style>
+          <a:lnRef idx="0">
+            <a:scrgbClr r="0" g="0" b="0"/>
+          </a:lnRef>
+          <a:fillRef idx="0">
+            <a:scrgbClr r="0" g="0" b="0"/>
+          </a:fillRef>
+          <a:effectRef idx="0">
+            <a:scrgbClr r="0" g="0" b="0"/>
+          </a:effectRef>
+          <a:fontRef idx="none"/>
+        </p:style>
+        <p:txBody>
+          <a:bodyPr rot="0" spcFirstLastPara="1" vertOverflow="overflow" horzOverflow="overflow" vert="horz" wrap="square" lIns="0" tIns="0" rIns="0" bIns="0" numCol="1" spcCol="38100" rtlCol="0" anchor="ctr">
+            <a:spAutoFit/>
+          </a:bodyPr>
+          <a:lstStyle/>
+          <a:p>
+            <a:pPr marL="0" marR="0" indent="0" algn="ctr" defTabSz="825500" rtl="0" fontAlgn="auto" latinLnBrk="0" hangingPunct="0">
+              <a:lnSpc>
+                <a:spcPct val="100000"/>
+              </a:lnSpc>
+              <a:spcBef>
+                <a:spcPts val="0"/>
+              </a:spcBef>
+              <a:spcAft>
+                <a:spcPts val="0"/>
+              </a:spcAft>
+              <a:buClrTx/>
+              <a:buSzTx/>
+              <a:buFontTx/>
+              <a:buNone/>
+              <a:tabLst/>
+            </a:pPr>
+            <a:endParaRPr kumimoji="0" lang="en-US" sz="3200" b="0" i="0" u="none" strike="noStrike" cap="none" spc="0" normalizeH="0" baseline="0">
+              <a:ln>
+                <a:noFill/>
+              </a:ln>
+              <a:solidFill>
+                <a:srgbClr val="FFFFFF"/>
+              </a:solidFill>
+              <a:effectLst/>
+              <a:uFillTx/>
+              <a:latin typeface="+mn-lt"/>
+              <a:ea typeface="+mn-ea"/>
+              <a:cs typeface="+mn-cs"/>
+              <a:sym typeface="Helvetica Neue Medium"/>
+            </a:endParaRPr>
+          </a:p>
+        </p:txBody>
+      </p:sp>
+      <p:sp>
+        <p:nvSpPr>
+          <p:cNvPr id="179" name="Heart 178">
+            <a:extLst>
+              <a:ext uri="{FF2B5EF4-FFF2-40B4-BE49-F238E27FC236}">
+                <a16:creationId xmlns:a16="http://schemas.microsoft.com/office/drawing/2014/main" id="{78E8A4FD-E637-4136-8C54-D3508090393C}"/>
+              </a:ext>
+            </a:extLst>
+          </p:cNvPr>
+          <p:cNvSpPr/>
+          <p:nvPr/>
+        </p:nvSpPr>
+        <p:spPr>
+          <a:xfrm rot="1044083">
+            <a:off x="5723903" y="2254798"/>
+            <a:ext cx="84165" cy="84165"/>
+          </a:xfrm>
+          <a:prstGeom prst="heart">
+            <a:avLst/>
+          </a:prstGeom>
+          <a:solidFill>
+            <a:schemeClr val="accent2">
+              <a:lumMod val="75000"/>
+            </a:schemeClr>
+          </a:solidFill>
+          <a:ln w="12700" cap="flat">
+            <a:noFill/>
+            <a:miter lim="400000"/>
+          </a:ln>
+          <a:effectLst/>
+          <a:sp3d/>
+        </p:spPr>
+        <p:style>
+          <a:lnRef idx="0">
+            <a:scrgbClr r="0" g="0" b="0"/>
+          </a:lnRef>
+          <a:fillRef idx="0">
+            <a:scrgbClr r="0" g="0" b="0"/>
+          </a:fillRef>
+          <a:effectRef idx="0">
+            <a:scrgbClr r="0" g="0" b="0"/>
+          </a:effectRef>
+          <a:fontRef idx="none"/>
+        </p:style>
+        <p:txBody>
+          <a:bodyPr rot="0" spcFirstLastPara="1" vertOverflow="overflow" horzOverflow="overflow" vert="horz" wrap="square" lIns="0" tIns="0" rIns="0" bIns="0" numCol="1" spcCol="38100" rtlCol="0" anchor="ctr">
+            <a:spAutoFit/>
+          </a:bodyPr>
+          <a:lstStyle/>
+          <a:p>
+            <a:pPr marL="0" marR="0" indent="0" algn="ctr" defTabSz="825500" rtl="0" fontAlgn="auto" latinLnBrk="0" hangingPunct="0">
+              <a:lnSpc>
+                <a:spcPct val="100000"/>
+              </a:lnSpc>
+              <a:spcBef>
+                <a:spcPts val="0"/>
+              </a:spcBef>
+              <a:spcAft>
+                <a:spcPts val="0"/>
+              </a:spcAft>
+              <a:buClrTx/>
+              <a:buSzTx/>
+              <a:buFontTx/>
+              <a:buNone/>
+              <a:tabLst/>
+            </a:pPr>
+            <a:endParaRPr kumimoji="0" lang="en-US" sz="3200" b="0" i="0" u="none" strike="noStrike" cap="none" spc="0" normalizeH="0" baseline="0">
+              <a:ln>
+                <a:noFill/>
+              </a:ln>
+              <a:solidFill>
+                <a:srgbClr val="FFFFFF"/>
+              </a:solidFill>
+              <a:effectLst/>
+              <a:uFillTx/>
+              <a:latin typeface="+mn-lt"/>
+              <a:ea typeface="+mn-ea"/>
+              <a:cs typeface="+mn-cs"/>
+              <a:sym typeface="Helvetica Neue Medium"/>
+            </a:endParaRPr>
+          </a:p>
+        </p:txBody>
+      </p:sp>
+      <p:sp>
+        <p:nvSpPr>
+          <p:cNvPr id="180" name="Heart 179">
+            <a:extLst>
+              <a:ext uri="{FF2B5EF4-FFF2-40B4-BE49-F238E27FC236}">
+                <a16:creationId xmlns:a16="http://schemas.microsoft.com/office/drawing/2014/main" id="{9C20FD4D-2919-4AAB-A352-81BEF9B64947}"/>
+              </a:ext>
+            </a:extLst>
+          </p:cNvPr>
+          <p:cNvSpPr/>
+          <p:nvPr/>
+        </p:nvSpPr>
+        <p:spPr>
+          <a:xfrm rot="20293074">
+            <a:off x="5085725" y="2282405"/>
+            <a:ext cx="84165" cy="84165"/>
+          </a:xfrm>
+          <a:prstGeom prst="heart">
+            <a:avLst/>
+          </a:prstGeom>
+          <a:solidFill>
+            <a:schemeClr val="accent2">
+              <a:lumMod val="75000"/>
+            </a:schemeClr>
+          </a:solidFill>
+          <a:ln w="12700" cap="flat">
+            <a:noFill/>
+            <a:miter lim="400000"/>
+          </a:ln>
+          <a:effectLst/>
+          <a:sp3d/>
+        </p:spPr>
+        <p:style>
+          <a:lnRef idx="0">
+            <a:scrgbClr r="0" g="0" b="0"/>
+          </a:lnRef>
+          <a:fillRef idx="0">
+            <a:scrgbClr r="0" g="0" b="0"/>
+          </a:fillRef>
+          <a:effectRef idx="0">
+            <a:scrgbClr r="0" g="0" b="0"/>
+          </a:effectRef>
+          <a:fontRef idx="none"/>
+        </p:style>
+        <p:txBody>
+          <a:bodyPr rot="0" spcFirstLastPara="1" vertOverflow="overflow" horzOverflow="overflow" vert="horz" wrap="square" lIns="0" tIns="0" rIns="0" bIns="0" numCol="1" spcCol="38100" rtlCol="0" anchor="ctr">
+            <a:spAutoFit/>
+          </a:bodyPr>
+          <a:lstStyle/>
+          <a:p>
+            <a:pPr marL="0" marR="0" indent="0" algn="ctr" defTabSz="825500" rtl="0" fontAlgn="auto" latinLnBrk="0" hangingPunct="0">
+              <a:lnSpc>
+                <a:spcPct val="100000"/>
+              </a:lnSpc>
+              <a:spcBef>
+                <a:spcPts val="0"/>
+              </a:spcBef>
+              <a:spcAft>
+                <a:spcPts val="0"/>
+              </a:spcAft>
+              <a:buClrTx/>
+              <a:buSzTx/>
+              <a:buFontTx/>
+              <a:buNone/>
+              <a:tabLst/>
+            </a:pPr>
+            <a:endParaRPr kumimoji="0" lang="en-US" sz="3200" b="0" i="0" u="none" strike="noStrike" cap="none" spc="0" normalizeH="0" baseline="0">
+              <a:ln>
+                <a:noFill/>
+              </a:ln>
+              <a:solidFill>
+                <a:srgbClr val="FFFFFF"/>
+              </a:solidFill>
+              <a:effectLst/>
+              <a:uFillTx/>
+              <a:latin typeface="+mn-lt"/>
+              <a:ea typeface="+mn-ea"/>
+              <a:cs typeface="+mn-cs"/>
+              <a:sym typeface="Helvetica Neue Medium"/>
+            </a:endParaRPr>
+          </a:p>
+        </p:txBody>
+      </p:sp>
+      <p:sp>
+        <p:nvSpPr>
+          <p:cNvPr id="181" name="Heart 180">
+            <a:extLst>
+              <a:ext uri="{FF2B5EF4-FFF2-40B4-BE49-F238E27FC236}">
+                <a16:creationId xmlns:a16="http://schemas.microsoft.com/office/drawing/2014/main" id="{3A8A4196-4027-474A-B68E-8F61BA375D64}"/>
+              </a:ext>
+            </a:extLst>
+          </p:cNvPr>
+          <p:cNvSpPr/>
+          <p:nvPr/>
+        </p:nvSpPr>
+        <p:spPr>
+          <a:xfrm rot="21112199">
+            <a:off x="5312954" y="2070871"/>
+            <a:ext cx="84165" cy="84165"/>
+          </a:xfrm>
+          <a:prstGeom prst="heart">
+            <a:avLst/>
+          </a:prstGeom>
+          <a:solidFill>
+            <a:schemeClr val="accent2">
+              <a:lumMod val="75000"/>
+            </a:schemeClr>
+          </a:solidFill>
+          <a:ln w="12700" cap="flat">
+            <a:noFill/>
+            <a:miter lim="400000"/>
+          </a:ln>
+          <a:effectLst/>
+          <a:sp3d/>
+        </p:spPr>
+        <p:style>
+          <a:lnRef idx="0">
+            <a:scrgbClr r="0" g="0" b="0"/>
+          </a:lnRef>
+          <a:fillRef idx="0">
+            <a:scrgbClr r="0" g="0" b="0"/>
+          </a:fillRef>
+          <a:effectRef idx="0">
+            <a:scrgbClr r="0" g="0" b="0"/>
+          </a:effectRef>
+          <a:fontRef idx="none"/>
+        </p:style>
+        <p:txBody>
+          <a:bodyPr rot="0" spcFirstLastPara="1" vertOverflow="overflow" horzOverflow="overflow" vert="horz" wrap="square" lIns="0" tIns="0" rIns="0" bIns="0" numCol="1" spcCol="38100" rtlCol="0" anchor="ctr">
+            <a:spAutoFit/>
+          </a:bodyPr>
+          <a:lstStyle/>
+          <a:p>
+            <a:pPr marL="0" marR="0" indent="0" algn="ctr" defTabSz="825500" rtl="0" fontAlgn="auto" latinLnBrk="0" hangingPunct="0">
+              <a:lnSpc>
+                <a:spcPct val="100000"/>
+              </a:lnSpc>
+              <a:spcBef>
+                <a:spcPts val="0"/>
+              </a:spcBef>
+              <a:spcAft>
+                <a:spcPts val="0"/>
+              </a:spcAft>
+              <a:buClrTx/>
+              <a:buSzTx/>
+              <a:buFontTx/>
+              <a:buNone/>
+              <a:tabLst/>
+            </a:pPr>
+            <a:endParaRPr kumimoji="0" lang="en-US" sz="3200" b="0" i="0" u="none" strike="noStrike" cap="none" spc="0" normalizeH="0" baseline="0">
+              <a:ln>
+                <a:noFill/>
+              </a:ln>
+              <a:solidFill>
+                <a:srgbClr val="FFFFFF"/>
+              </a:solidFill>
+              <a:effectLst/>
+              <a:uFillTx/>
+              <a:latin typeface="+mn-lt"/>
+              <a:ea typeface="+mn-ea"/>
+              <a:cs typeface="+mn-cs"/>
+              <a:sym typeface="Helvetica Neue Medium"/>
+            </a:endParaRPr>
+          </a:p>
+        </p:txBody>
+      </p:sp>
+      <p:sp>
+        <p:nvSpPr>
+          <p:cNvPr id="182" name="Heart 181">
+            <a:extLst>
+              <a:ext uri="{FF2B5EF4-FFF2-40B4-BE49-F238E27FC236}">
+                <a16:creationId xmlns:a16="http://schemas.microsoft.com/office/drawing/2014/main" id="{DA43734A-4EDA-4EF8-AE8D-9E84A0206C2A}"/>
+              </a:ext>
+            </a:extLst>
+          </p:cNvPr>
+          <p:cNvSpPr/>
+          <p:nvPr/>
+        </p:nvSpPr>
+        <p:spPr>
+          <a:xfrm rot="1238601">
+            <a:off x="5605828" y="2120989"/>
+            <a:ext cx="84165" cy="84165"/>
+          </a:xfrm>
+          <a:prstGeom prst="heart">
+            <a:avLst/>
+          </a:prstGeom>
+          <a:solidFill>
+            <a:schemeClr val="accent2">
+              <a:lumMod val="75000"/>
+            </a:schemeClr>
+          </a:solidFill>
+          <a:ln w="12700" cap="flat">
+            <a:noFill/>
+            <a:miter lim="400000"/>
+          </a:ln>
+          <a:effectLst/>
+          <a:sp3d/>
+        </p:spPr>
+        <p:style>
+          <a:lnRef idx="0">
+            <a:scrgbClr r="0" g="0" b="0"/>
+          </a:lnRef>
+          <a:fillRef idx="0">
+            <a:scrgbClr r="0" g="0" b="0"/>
+          </a:fillRef>
+          <a:effectRef idx="0">
+            <a:scrgbClr r="0" g="0" b="0"/>
+          </a:effectRef>
+          <a:fontRef idx="none"/>
+        </p:style>
+        <p:txBody>
+          <a:bodyPr rot="0" spcFirstLastPara="1" vertOverflow="overflow" horzOverflow="overflow" vert="horz" wrap="square" lIns="0" tIns="0" rIns="0" bIns="0" numCol="1" spcCol="38100" rtlCol="0" anchor="ctr">
+            <a:spAutoFit/>
+          </a:bodyPr>
+          <a:lstStyle/>
+          <a:p>
+            <a:pPr marL="0" marR="0" indent="0" algn="ctr" defTabSz="825500" rtl="0" fontAlgn="auto" latinLnBrk="0" hangingPunct="0">
+              <a:lnSpc>
+                <a:spcPct val="100000"/>
+              </a:lnSpc>
+              <a:spcBef>
+                <a:spcPts val="0"/>
+              </a:spcBef>
+              <a:spcAft>
+                <a:spcPts val="0"/>
+              </a:spcAft>
+              <a:buClrTx/>
+              <a:buSzTx/>
+              <a:buFontTx/>
+              <a:buNone/>
+              <a:tabLst/>
+            </a:pPr>
+            <a:endParaRPr kumimoji="0" lang="en-US" sz="3200" b="0" i="0" u="none" strike="noStrike" cap="none" spc="0" normalizeH="0" baseline="0">
+              <a:ln>
+                <a:noFill/>
+              </a:ln>
+              <a:solidFill>
+                <a:srgbClr val="FFFFFF"/>
+              </a:solidFill>
+              <a:effectLst/>
+              <a:uFillTx/>
+              <a:latin typeface="+mn-lt"/>
+              <a:ea typeface="+mn-ea"/>
+              <a:cs typeface="+mn-cs"/>
+              <a:sym typeface="Helvetica Neue Medium"/>
+            </a:endParaRPr>
+          </a:p>
+        </p:txBody>
+      </p:sp>
+      <p:sp>
+        <p:nvSpPr>
+          <p:cNvPr id="183" name="Heart 182">
+            <a:extLst>
+              <a:ext uri="{FF2B5EF4-FFF2-40B4-BE49-F238E27FC236}">
+                <a16:creationId xmlns:a16="http://schemas.microsoft.com/office/drawing/2014/main" id="{8BB0E08F-2AAE-4C1B-B005-FA1CDF269971}"/>
+              </a:ext>
+            </a:extLst>
+          </p:cNvPr>
+          <p:cNvSpPr/>
+          <p:nvPr/>
+        </p:nvSpPr>
+        <p:spPr>
+          <a:xfrm rot="837863">
+            <a:off x="5592403" y="2544325"/>
+            <a:ext cx="84165" cy="84165"/>
+          </a:xfrm>
+          <a:prstGeom prst="heart">
+            <a:avLst/>
+          </a:prstGeom>
+          <a:solidFill>
+            <a:schemeClr val="accent2">
+              <a:lumMod val="75000"/>
+            </a:schemeClr>
+          </a:solidFill>
+          <a:ln w="12700" cap="flat">
+            <a:noFill/>
+            <a:miter lim="400000"/>
+          </a:ln>
+          <a:effectLst/>
+          <a:sp3d/>
+        </p:spPr>
+        <p:style>
+          <a:lnRef idx="0">
+            <a:scrgbClr r="0" g="0" b="0"/>
+          </a:lnRef>
+          <a:fillRef idx="0">
+            <a:scrgbClr r="0" g="0" b="0"/>
+          </a:fillRef>
+          <a:effectRef idx="0">
+            <a:scrgbClr r="0" g="0" b="0"/>
+          </a:effectRef>
+          <a:fontRef idx="none"/>
+        </p:style>
+        <p:txBody>
+          <a:bodyPr rot="0" spcFirstLastPara="1" vertOverflow="overflow" horzOverflow="overflow" vert="horz" wrap="square" lIns="0" tIns="0" rIns="0" bIns="0" numCol="1" spcCol="38100" rtlCol="0" anchor="ctr">
+            <a:spAutoFit/>
+          </a:bodyPr>
+          <a:lstStyle/>
+          <a:p>
+            <a:pPr marL="0" marR="0" indent="0" algn="ctr" defTabSz="825500" rtl="0" fontAlgn="auto" latinLnBrk="0" hangingPunct="0">
+              <a:lnSpc>
+                <a:spcPct val="100000"/>
+              </a:lnSpc>
+              <a:spcBef>
+                <a:spcPts val="0"/>
+              </a:spcBef>
+              <a:spcAft>
+                <a:spcPts val="0"/>
+              </a:spcAft>
+              <a:buClrTx/>
+              <a:buSzTx/>
+              <a:buFontTx/>
+              <a:buNone/>
+              <a:tabLst/>
+            </a:pPr>
+            <a:endParaRPr kumimoji="0" lang="en-US" sz="3200" b="0" i="0" u="none" strike="noStrike" cap="none" spc="0" normalizeH="0" baseline="0" dirty="0">
+              <a:ln>
+                <a:noFill/>
+              </a:ln>
+              <a:solidFill>
+                <a:srgbClr val="FFFFFF"/>
+              </a:solidFill>
+              <a:effectLst/>
+              <a:uFillTx/>
+              <a:latin typeface="+mn-lt"/>
+              <a:ea typeface="+mn-ea"/>
+              <a:cs typeface="+mn-cs"/>
+              <a:sym typeface="Helvetica Neue Medium"/>
+            </a:endParaRPr>
+          </a:p>
+        </p:txBody>
+      </p:sp>
+      <p:sp>
+        <p:nvSpPr>
+          <p:cNvPr id="184" name="Heart 183">
+            <a:extLst>
+              <a:ext uri="{FF2B5EF4-FFF2-40B4-BE49-F238E27FC236}">
+                <a16:creationId xmlns:a16="http://schemas.microsoft.com/office/drawing/2014/main" id="{4BE61E34-0882-47FE-B633-357882824437}"/>
+              </a:ext>
+            </a:extLst>
+          </p:cNvPr>
+          <p:cNvSpPr/>
+          <p:nvPr/>
+        </p:nvSpPr>
+        <p:spPr>
+          <a:xfrm rot="20949119">
+            <a:off x="5282998" y="2625001"/>
+            <a:ext cx="84165" cy="84165"/>
+          </a:xfrm>
+          <a:prstGeom prst="heart">
+            <a:avLst/>
+          </a:prstGeom>
+          <a:solidFill>
+            <a:schemeClr val="accent2">
+              <a:lumMod val="75000"/>
+            </a:schemeClr>
+          </a:solidFill>
+          <a:ln w="12700" cap="flat">
+            <a:noFill/>
+            <a:miter lim="400000"/>
+          </a:ln>
+          <a:effectLst/>
+          <a:sp3d/>
+        </p:spPr>
+        <p:style>
+          <a:lnRef idx="0">
+            <a:scrgbClr r="0" g="0" b="0"/>
+          </a:lnRef>
+          <a:fillRef idx="0">
+            <a:scrgbClr r="0" g="0" b="0"/>
+          </a:fillRef>
+          <a:effectRef idx="0">
+            <a:scrgbClr r="0" g="0" b="0"/>
+          </a:effectRef>
+          <a:fontRef idx="none"/>
+        </p:style>
+        <p:txBody>
+          <a:bodyPr rot="0" spcFirstLastPara="1" vertOverflow="overflow" horzOverflow="overflow" vert="horz" wrap="square" lIns="0" tIns="0" rIns="0" bIns="0" numCol="1" spcCol="38100" rtlCol="0" anchor="ctr">
+            <a:spAutoFit/>
+          </a:bodyPr>
+          <a:lstStyle/>
+          <a:p>
+            <a:pPr marL="0" marR="0" indent="0" algn="ctr" defTabSz="825500" rtl="0" fontAlgn="auto" latinLnBrk="0" hangingPunct="0">
+              <a:lnSpc>
+                <a:spcPct val="100000"/>
+              </a:lnSpc>
+              <a:spcBef>
+                <a:spcPts val="0"/>
+              </a:spcBef>
+              <a:spcAft>
+                <a:spcPts val="0"/>
+              </a:spcAft>
+              <a:buClrTx/>
+              <a:buSzTx/>
+              <a:buFontTx/>
+              <a:buNone/>
+              <a:tabLst/>
+            </a:pPr>
+            <a:endParaRPr kumimoji="0" lang="en-US" sz="3200" b="0" i="0" u="none" strike="noStrike" cap="none" spc="0" normalizeH="0" baseline="0">
+              <a:ln>
+                <a:noFill/>
+              </a:ln>
+              <a:solidFill>
+                <a:srgbClr val="FFFFFF"/>
+              </a:solidFill>
+              <a:effectLst/>
+              <a:uFillTx/>
+              <a:latin typeface="+mn-lt"/>
+              <a:ea typeface="+mn-ea"/>
+              <a:cs typeface="+mn-cs"/>
+              <a:sym typeface="Helvetica Neue Medium"/>
+            </a:endParaRPr>
+          </a:p>
+        </p:txBody>
+      </p:sp>
+      <p:sp>
+        <p:nvSpPr>
+          <p:cNvPr id="185" name="Heart 184">
+            <a:extLst>
+              <a:ext uri="{FF2B5EF4-FFF2-40B4-BE49-F238E27FC236}">
+                <a16:creationId xmlns:a16="http://schemas.microsoft.com/office/drawing/2014/main" id="{EB9C8C8D-FF9A-43C5-9A1D-C21C2111822F}"/>
+              </a:ext>
+            </a:extLst>
+          </p:cNvPr>
+          <p:cNvSpPr/>
+          <p:nvPr/>
+        </p:nvSpPr>
+        <p:spPr>
+          <a:xfrm>
+            <a:off x="5516330" y="2721354"/>
+            <a:ext cx="84165" cy="84165"/>
+          </a:xfrm>
+          <a:prstGeom prst="heart">
+            <a:avLst/>
+          </a:prstGeom>
+          <a:solidFill>
+            <a:schemeClr val="accent2">
+              <a:lumMod val="75000"/>
+            </a:schemeClr>
+          </a:solidFill>
+          <a:ln w="12700" cap="flat">
+            <a:noFill/>
+            <a:miter lim="400000"/>
+          </a:ln>
+          <a:effectLst/>
+          <a:sp3d/>
+        </p:spPr>
+        <p:style>
+          <a:lnRef idx="0">
+            <a:scrgbClr r="0" g="0" b="0"/>
+          </a:lnRef>
+          <a:fillRef idx="0">
+            <a:scrgbClr r="0" g="0" b="0"/>
+          </a:fillRef>
+          <a:effectRef idx="0">
+            <a:scrgbClr r="0" g="0" b="0"/>
+          </a:effectRef>
+          <a:fontRef idx="none"/>
+        </p:style>
+        <p:txBody>
+          <a:bodyPr rot="0" spcFirstLastPara="1" vertOverflow="overflow" horzOverflow="overflow" vert="horz" wrap="square" lIns="0" tIns="0" rIns="0" bIns="0" numCol="1" spcCol="38100" rtlCol="0" anchor="ctr">
+            <a:spAutoFit/>
+          </a:bodyPr>
+          <a:lstStyle/>
+          <a:p>
+            <a:pPr marL="0" marR="0" indent="0" algn="ctr" defTabSz="825500" rtl="0" fontAlgn="auto" latinLnBrk="0" hangingPunct="0">
+              <a:lnSpc>
+                <a:spcPct val="100000"/>
+              </a:lnSpc>
+              <a:spcBef>
+                <a:spcPts val="0"/>
+              </a:spcBef>
+              <a:spcAft>
+                <a:spcPts val="0"/>
+              </a:spcAft>
+              <a:buClrTx/>
+              <a:buSzTx/>
+              <a:buFontTx/>
+              <a:buNone/>
+              <a:tabLst/>
+            </a:pPr>
+            <a:endParaRPr kumimoji="0" lang="en-US" sz="3200" b="0" i="0" u="none" strike="noStrike" cap="none" spc="0" normalizeH="0" baseline="0">
+              <a:ln>
+                <a:noFill/>
+              </a:ln>
+              <a:solidFill>
+                <a:srgbClr val="FFFFFF"/>
+              </a:solidFill>
+              <a:effectLst/>
+              <a:uFillTx/>
+              <a:latin typeface="+mn-lt"/>
+              <a:ea typeface="+mn-ea"/>
+              <a:cs typeface="+mn-cs"/>
+              <a:sym typeface="Helvetica Neue Medium"/>
+            </a:endParaRPr>
+          </a:p>
+        </p:txBody>
+      </p:sp>
+      <p:sp>
+        <p:nvSpPr>
+          <p:cNvPr id="186" name="Heart 185">
+            <a:extLst>
+              <a:ext uri="{FF2B5EF4-FFF2-40B4-BE49-F238E27FC236}">
+                <a16:creationId xmlns:a16="http://schemas.microsoft.com/office/drawing/2014/main" id="{2E5CAC0B-30C2-4695-8068-BF77A841145E}"/>
+              </a:ext>
+            </a:extLst>
+          </p:cNvPr>
+          <p:cNvSpPr/>
+          <p:nvPr/>
+        </p:nvSpPr>
+        <p:spPr>
+          <a:xfrm rot="1609585">
+            <a:off x="5716590" y="2675417"/>
+            <a:ext cx="84165" cy="84165"/>
+          </a:xfrm>
+          <a:prstGeom prst="heart">
+            <a:avLst/>
+          </a:prstGeom>
+          <a:solidFill>
+            <a:schemeClr val="accent2">
+              <a:lumMod val="75000"/>
+            </a:schemeClr>
+          </a:solidFill>
+          <a:ln w="12700" cap="flat">
+            <a:noFill/>
+            <a:miter lim="400000"/>
+          </a:ln>
+          <a:effectLst/>
+          <a:sp3d/>
+        </p:spPr>
+        <p:style>
+          <a:lnRef idx="0">
+            <a:scrgbClr r="0" g="0" b="0"/>
+          </a:lnRef>
+          <a:fillRef idx="0">
+            <a:scrgbClr r="0" g="0" b="0"/>
+          </a:fillRef>
+          <a:effectRef idx="0">
+            <a:scrgbClr r="0" g="0" b="0"/>
+          </a:effectRef>
+          <a:fontRef idx="none"/>
+        </p:style>
+        <p:txBody>
+          <a:bodyPr rot="0" spcFirstLastPara="1" vertOverflow="overflow" horzOverflow="overflow" vert="horz" wrap="square" lIns="0" tIns="0" rIns="0" bIns="0" numCol="1" spcCol="38100" rtlCol="0" anchor="ctr">
+            <a:spAutoFit/>
+          </a:bodyPr>
+          <a:lstStyle/>
+          <a:p>
+            <a:pPr marL="0" marR="0" indent="0" algn="ctr" defTabSz="825500" rtl="0" fontAlgn="auto" latinLnBrk="0" hangingPunct="0">
+              <a:lnSpc>
+                <a:spcPct val="100000"/>
+              </a:lnSpc>
+              <a:spcBef>
+                <a:spcPts val="0"/>
+              </a:spcBef>
+              <a:spcAft>
+                <a:spcPts val="0"/>
+              </a:spcAft>
+              <a:buClrTx/>
+              <a:buSzTx/>
+              <a:buFontTx/>
+              <a:buNone/>
+              <a:tabLst/>
+            </a:pPr>
+            <a:endParaRPr kumimoji="0" lang="en-US" sz="3200" b="0" i="0" u="none" strike="noStrike" cap="none" spc="0" normalizeH="0" baseline="0">
+              <a:ln>
+                <a:noFill/>
+              </a:ln>
+              <a:solidFill>
+                <a:srgbClr val="FFFFFF"/>
+              </a:solidFill>
+              <a:effectLst/>
+              <a:uFillTx/>
+              <a:latin typeface="+mn-lt"/>
+              <a:ea typeface="+mn-ea"/>
+              <a:cs typeface="+mn-cs"/>
+              <a:sym typeface="Helvetica Neue Medium"/>
+            </a:endParaRPr>
+          </a:p>
+        </p:txBody>
+      </p:sp>
     </p:spTree>
     <p:extLst>
       <p:ext uri="{BB962C8B-B14F-4D97-AF65-F5344CB8AC3E}">

</xml_diff>